<commit_message>
Poster version 2. (Add ubi's img)
</commit_message>
<xml_diff>
--- a/poster.pptx
+++ b/poster.pptx
@@ -3986,8 +3986,8 @@
         </p:nvSpPr>
         <p:spPr>
           <a:xfrm>
-            <a:off x="1188344" y="6931075"/>
-            <a:ext cx="19010112" cy="1569660"/>
+            <a:off x="1980432" y="23708939"/>
+            <a:ext cx="8136904" cy="3785652"/>
           </a:xfrm>
           <a:prstGeom prst="rect">
             <a:avLst/>
@@ -4063,7 +4063,7 @@
       </p:pic>
       <p:pic>
         <p:nvPicPr>
-          <p:cNvPr id="1027" name="Picture 3" descr="C:\Documents and Settings\user\桌面\MobileProgramming\project\screenshot\device-2011-12-22-150203_newplaylist.png"/>
+          <p:cNvPr id="17" name="Picture 4" descr="C:\Documents and Settings\user\桌面\MobileProgramming\project\screenshot\device-2011-12-22-145919_gmap.png"/>
           <p:cNvPicPr>
             <a:picLocks noChangeAspect="1" noChangeArrowheads="1"/>
           </p:cNvPicPr>
@@ -4071,14 +4071,13 @@
         </p:nvPicPr>
         <p:blipFill>
           <a:blip r:embed="rId4" cstate="print"/>
-          <a:srcRect/>
           <a:stretch>
             <a:fillRect/>
           </a:stretch>
         </p:blipFill>
         <p:spPr bwMode="auto">
           <a:xfrm>
-            <a:off x="14869864" y="11035531"/>
+            <a:off x="2700512" y="6931075"/>
             <a:ext cx="4572000" cy="7620000"/>
           </a:xfrm>
           <a:prstGeom prst="rect">
@@ -4087,41 +4086,9 @@
           <a:noFill/>
           <a:ln w="38100">
             <a:solidFill>
-              <a:schemeClr val="accent3"/>
-            </a:solidFill>
-            <a:prstDash val="solid"/>
-          </a:ln>
-        </p:spPr>
-      </p:pic>
-      <p:pic>
-        <p:nvPicPr>
-          <p:cNvPr id="1028" name="Picture 4" descr="C:\Documents and Settings\user\桌面\MobileProgramming\project\screenshot\device-2011-12-22-145919_gmap.png"/>
-          <p:cNvPicPr>
-            <a:picLocks noChangeAspect="1" noChangeArrowheads="1"/>
-          </p:cNvPicPr>
-          <p:nvPr/>
-        </p:nvPicPr>
-        <p:blipFill>
-          <a:blip r:embed="rId5" cstate="print"/>
-          <a:srcRect/>
-          <a:stretch>
-            <a:fillRect/>
-          </a:stretch>
-        </p:blipFill>
-        <p:spPr bwMode="auto">
-          <a:xfrm>
-            <a:off x="14834368" y="21260667"/>
-            <a:ext cx="4572000" cy="7620000"/>
-          </a:xfrm>
-          <a:prstGeom prst="rect">
-            <a:avLst/>
-          </a:prstGeom>
-          <a:noFill/>
-          <a:ln w="38100">
-            <a:solidFill>
-              <a:schemeClr val="tx2">
-                <a:lumMod val="40000"/>
-                <a:lumOff val="60000"/>
+              <a:schemeClr val="accent2">
+                <a:lumMod val="60000"/>
+                <a:lumOff val="40000"/>
               </a:schemeClr>
             </a:solidFill>
           </a:ln>
@@ -4129,14 +4096,14 @@
       </p:pic>
       <p:sp>
         <p:nvSpPr>
-          <p:cNvPr id="15" name="文字方塊 14"/>
+          <p:cNvPr id="18" name="文字方塊 17"/>
           <p:cNvSpPr txBox="1"/>
           <p:nvPr/>
         </p:nvSpPr>
         <p:spPr>
           <a:xfrm>
-            <a:off x="14653840" y="19028419"/>
-            <a:ext cx="5112567" cy="2123658"/>
+            <a:off x="1980432" y="14923963"/>
+            <a:ext cx="17929992" cy="6863417"/>
           </a:xfrm>
           <a:prstGeom prst="rect">
             <a:avLst/>
@@ -4164,6 +4131,442 @@
             <a:spAutoFit/>
           </a:bodyPr>
           <a:lstStyle/>
+          <a:p>
+            <a:r>
+              <a:rPr lang="zh-TW" altLang="en-US" sz="4400" b="1" dirty="0" smtClean="0">
+                <a:ln w="10541" cmpd="sng">
+                  <a:solidFill>
+                    <a:schemeClr val="accent2">
+                      <a:lumMod val="50000"/>
+                    </a:schemeClr>
+                  </a:solidFill>
+                  <a:prstDash val="solid"/>
+                </a:ln>
+                <a:gradFill>
+                  <a:gsLst>
+                    <a:gs pos="0">
+                      <a:schemeClr val="accent2">
+                        <a:lumMod val="40000"/>
+                        <a:lumOff val="60000"/>
+                      </a:schemeClr>
+                    </a:gs>
+                    <a:gs pos="9000">
+                      <a:schemeClr val="accent2">
+                        <a:lumMod val="60000"/>
+                        <a:lumOff val="40000"/>
+                      </a:schemeClr>
+                    </a:gs>
+                    <a:gs pos="50000">
+                      <a:schemeClr val="accent2">
+                        <a:lumMod val="75000"/>
+                      </a:schemeClr>
+                    </a:gs>
+                    <a:gs pos="79000">
+                      <a:schemeClr val="accent2">
+                        <a:lumMod val="60000"/>
+                        <a:lumOff val="40000"/>
+                      </a:schemeClr>
+                    </a:gs>
+                    <a:gs pos="100000">
+                      <a:schemeClr val="accent2">
+                        <a:lumMod val="40000"/>
+                        <a:lumOff val="60000"/>
+                      </a:schemeClr>
+                    </a:gs>
+                  </a:gsLst>
+                  <a:lin ang="5400000"/>
+                </a:gradFill>
+              </a:rPr>
+              <a:t>＊</a:t>
+            </a:r>
+            <a:r>
+              <a:rPr lang="zh-TW" altLang="en-US" sz="4400" dirty="0" smtClean="0"/>
+              <a:t> </a:t>
+            </a:r>
+            <a:r>
+              <a:rPr lang="en-US" altLang="zh-TW" sz="4400" dirty="0" smtClean="0"/>
+              <a:t>Angry Runner </a:t>
+            </a:r>
+            <a:r>
+              <a:rPr lang="zh-TW" altLang="en-US" sz="4400" dirty="0" smtClean="0"/>
+              <a:t>利用手機內建的 </a:t>
+            </a:r>
+            <a:r>
+              <a:rPr lang="en-US" altLang="zh-TW" sz="4400" dirty="0" smtClean="0"/>
+              <a:t>GPS </a:t>
+            </a:r>
+            <a:r>
+              <a:rPr lang="zh-TW" altLang="en-US" sz="4400" dirty="0" smtClean="0"/>
+              <a:t>即時掌握您的運動時間、距離、和速度</a:t>
+            </a:r>
+            <a:r>
+              <a:rPr lang="zh-TW" altLang="en-US" sz="4400" dirty="0" smtClean="0"/>
+              <a:t>，並</a:t>
+            </a:r>
+            <a:r>
+              <a:rPr lang="zh-TW" altLang="en-US" sz="4400" dirty="0" smtClean="0"/>
+              <a:t>即時計算卡路里消耗量</a:t>
+            </a:r>
+            <a:r>
+              <a:rPr lang="zh-TW" altLang="en-US" sz="4400" dirty="0" smtClean="0"/>
+              <a:t>。</a:t>
+            </a:r>
+            <a:endParaRPr lang="en-US" altLang="zh-TW" sz="4400" dirty="0" smtClean="0"/>
+          </a:p>
+          <a:p>
+            <a:r>
+              <a:rPr lang="zh-TW" altLang="en-US" sz="4400" b="1" dirty="0" smtClean="0">
+                <a:ln w="10541" cmpd="sng">
+                  <a:solidFill>
+                    <a:schemeClr val="accent2">
+                      <a:lumMod val="50000"/>
+                    </a:schemeClr>
+                  </a:solidFill>
+                  <a:prstDash val="solid"/>
+                </a:ln>
+                <a:gradFill>
+                  <a:gsLst>
+                    <a:gs pos="0">
+                      <a:schemeClr val="accent2">
+                        <a:lumMod val="40000"/>
+                        <a:lumOff val="60000"/>
+                      </a:schemeClr>
+                    </a:gs>
+                    <a:gs pos="9000">
+                      <a:schemeClr val="accent2">
+                        <a:lumMod val="60000"/>
+                        <a:lumOff val="40000"/>
+                      </a:schemeClr>
+                    </a:gs>
+                    <a:gs pos="50000">
+                      <a:schemeClr val="accent2">
+                        <a:lumMod val="75000"/>
+                      </a:schemeClr>
+                    </a:gs>
+                    <a:gs pos="79000">
+                      <a:schemeClr val="accent2">
+                        <a:lumMod val="60000"/>
+                        <a:lumOff val="40000"/>
+                      </a:schemeClr>
+                    </a:gs>
+                    <a:gs pos="100000">
+                      <a:schemeClr val="accent2">
+                        <a:lumMod val="40000"/>
+                        <a:lumOff val="60000"/>
+                      </a:schemeClr>
+                    </a:gs>
+                  </a:gsLst>
+                  <a:lin ang="5400000"/>
+                </a:gradFill>
+              </a:rPr>
+              <a:t>＊</a:t>
+            </a:r>
+            <a:r>
+              <a:rPr lang="zh-TW" altLang="en-US" sz="4400" b="1" dirty="0" smtClean="0">
+                <a:ln w="10541" cmpd="sng">
+                  <a:solidFill>
+                    <a:schemeClr val="accent3">
+                      <a:lumMod val="50000"/>
+                    </a:schemeClr>
+                  </a:solidFill>
+                  <a:prstDash val="solid"/>
+                </a:ln>
+                <a:gradFill>
+                  <a:gsLst>
+                    <a:gs pos="0">
+                      <a:schemeClr val="accent3">
+                        <a:lumMod val="40000"/>
+                        <a:lumOff val="60000"/>
+                      </a:schemeClr>
+                    </a:gs>
+                    <a:gs pos="9000">
+                      <a:schemeClr val="accent3">
+                        <a:lumMod val="60000"/>
+                        <a:lumOff val="40000"/>
+                      </a:schemeClr>
+                    </a:gs>
+                    <a:gs pos="50000">
+                      <a:schemeClr val="accent3">
+                        <a:lumMod val="75000"/>
+                      </a:schemeClr>
+                    </a:gs>
+                    <a:gs pos="79000">
+                      <a:schemeClr val="accent3">
+                        <a:lumMod val="60000"/>
+                        <a:lumOff val="40000"/>
+                      </a:schemeClr>
+                    </a:gs>
+                    <a:gs pos="100000">
+                      <a:schemeClr val="accent3">
+                        <a:lumMod val="40000"/>
+                        <a:lumOff val="60000"/>
+                      </a:schemeClr>
+                    </a:gs>
+                  </a:gsLst>
+                  <a:lin ang="5400000"/>
+                </a:gradFill>
+              </a:rPr>
+              <a:t> </a:t>
+            </a:r>
+            <a:r>
+              <a:rPr lang="en-US" altLang="zh-TW" sz="4400" dirty="0" smtClean="0"/>
+              <a:t>Angry Runner </a:t>
+            </a:r>
+            <a:r>
+              <a:rPr lang="zh-TW" altLang="en-US" sz="4400" dirty="0" smtClean="0"/>
+              <a:t>會在您開始運動時自動播放音樂</a:t>
+            </a:r>
+            <a:r>
+              <a:rPr lang="zh-TW" altLang="en-US" sz="4400" dirty="0" smtClean="0"/>
+              <a:t>。</a:t>
+            </a:r>
+            <a:endParaRPr lang="en-US" altLang="zh-TW" sz="4400" dirty="0" smtClean="0"/>
+          </a:p>
+          <a:p>
+            <a:r>
+              <a:rPr lang="zh-TW" altLang="en-US" sz="4400" b="1" dirty="0" smtClean="0">
+                <a:ln w="10541" cmpd="sng">
+                  <a:solidFill>
+                    <a:schemeClr val="accent2">
+                      <a:lumMod val="50000"/>
+                    </a:schemeClr>
+                  </a:solidFill>
+                  <a:prstDash val="solid"/>
+                </a:ln>
+                <a:gradFill>
+                  <a:gsLst>
+                    <a:gs pos="0">
+                      <a:schemeClr val="accent2">
+                        <a:lumMod val="40000"/>
+                        <a:lumOff val="60000"/>
+                      </a:schemeClr>
+                    </a:gs>
+                    <a:gs pos="9000">
+                      <a:schemeClr val="accent2">
+                        <a:lumMod val="60000"/>
+                        <a:lumOff val="40000"/>
+                      </a:schemeClr>
+                    </a:gs>
+                    <a:gs pos="50000">
+                      <a:schemeClr val="accent2">
+                        <a:lumMod val="75000"/>
+                      </a:schemeClr>
+                    </a:gs>
+                    <a:gs pos="79000">
+                      <a:schemeClr val="accent2">
+                        <a:lumMod val="60000"/>
+                        <a:lumOff val="40000"/>
+                      </a:schemeClr>
+                    </a:gs>
+                    <a:gs pos="100000">
+                      <a:schemeClr val="accent2">
+                        <a:lumMod val="40000"/>
+                        <a:lumOff val="60000"/>
+                      </a:schemeClr>
+                    </a:gs>
+                  </a:gsLst>
+                  <a:lin ang="5400000"/>
+                </a:gradFill>
+              </a:rPr>
+              <a:t>＊</a:t>
+            </a:r>
+            <a:r>
+              <a:rPr lang="zh-TW" altLang="en-US" sz="4400" b="1" dirty="0" smtClean="0">
+                <a:ln w="10541" cmpd="sng">
+                  <a:solidFill>
+                    <a:schemeClr val="accent3">
+                      <a:lumMod val="50000"/>
+                    </a:schemeClr>
+                  </a:solidFill>
+                  <a:prstDash val="solid"/>
+                </a:ln>
+                <a:gradFill>
+                  <a:gsLst>
+                    <a:gs pos="0">
+                      <a:schemeClr val="accent3">
+                        <a:lumMod val="40000"/>
+                        <a:lumOff val="60000"/>
+                      </a:schemeClr>
+                    </a:gs>
+                    <a:gs pos="9000">
+                      <a:schemeClr val="accent3">
+                        <a:lumMod val="60000"/>
+                        <a:lumOff val="40000"/>
+                      </a:schemeClr>
+                    </a:gs>
+                    <a:gs pos="50000">
+                      <a:schemeClr val="accent3">
+                        <a:lumMod val="75000"/>
+                      </a:schemeClr>
+                    </a:gs>
+                    <a:gs pos="79000">
+                      <a:schemeClr val="accent3">
+                        <a:lumMod val="60000"/>
+                        <a:lumOff val="40000"/>
+                      </a:schemeClr>
+                    </a:gs>
+                    <a:gs pos="100000">
+                      <a:schemeClr val="accent3">
+                        <a:lumMod val="40000"/>
+                        <a:lumOff val="60000"/>
+                      </a:schemeClr>
+                    </a:gs>
+                  </a:gsLst>
+                  <a:lin ang="5400000"/>
+                </a:gradFill>
+              </a:rPr>
+              <a:t> </a:t>
+            </a:r>
+            <a:r>
+              <a:rPr lang="en-US" altLang="zh-TW" sz="4400" dirty="0" smtClean="0"/>
+              <a:t>Angry </a:t>
+            </a:r>
+            <a:r>
+              <a:rPr lang="en-US" altLang="zh-TW" sz="4400" dirty="0" smtClean="0"/>
+              <a:t>Runner </a:t>
+            </a:r>
+            <a:r>
+              <a:rPr lang="zh-TW" altLang="en-US" sz="4400" dirty="0" smtClean="0"/>
+              <a:t>會依您運動的速度自動調整音樂的音量，提醒您保持適當地運動速度</a:t>
+            </a:r>
+            <a:r>
+              <a:rPr lang="zh-TW" altLang="en-US" sz="4400" dirty="0" smtClean="0"/>
+              <a:t>。</a:t>
+            </a:r>
+            <a:endParaRPr lang="en-US" altLang="zh-TW" sz="4400" dirty="0" smtClean="0"/>
+          </a:p>
+          <a:p>
+            <a:r>
+              <a:rPr lang="zh-TW" altLang="en-US" sz="4400" b="1" dirty="0" smtClean="0">
+                <a:ln w="10541" cmpd="sng">
+                  <a:solidFill>
+                    <a:schemeClr val="accent3">
+                      <a:lumMod val="50000"/>
+                    </a:schemeClr>
+                  </a:solidFill>
+                  <a:prstDash val="solid"/>
+                </a:ln>
+                <a:gradFill>
+                  <a:gsLst>
+                    <a:gs pos="0">
+                      <a:schemeClr val="accent3">
+                        <a:lumMod val="40000"/>
+                        <a:lumOff val="60000"/>
+                      </a:schemeClr>
+                    </a:gs>
+                    <a:gs pos="9000">
+                      <a:schemeClr val="accent3">
+                        <a:lumMod val="60000"/>
+                        <a:lumOff val="40000"/>
+                      </a:schemeClr>
+                    </a:gs>
+                    <a:gs pos="50000">
+                      <a:schemeClr val="accent3">
+                        <a:lumMod val="75000"/>
+                      </a:schemeClr>
+                    </a:gs>
+                    <a:gs pos="79000">
+                      <a:schemeClr val="accent3">
+                        <a:lumMod val="60000"/>
+                        <a:lumOff val="40000"/>
+                      </a:schemeClr>
+                    </a:gs>
+                    <a:gs pos="100000">
+                      <a:schemeClr val="accent3">
+                        <a:lumMod val="40000"/>
+                        <a:lumOff val="60000"/>
+                      </a:schemeClr>
+                    </a:gs>
+                  </a:gsLst>
+                  <a:lin ang="5400000"/>
+                </a:gradFill>
+              </a:rPr>
+              <a:t>＊</a:t>
+            </a:r>
+            <a:r>
+              <a:rPr lang="zh-TW" altLang="en-US" sz="4400" dirty="0" smtClean="0"/>
+              <a:t>您可以在 </a:t>
+            </a:r>
+            <a:r>
+              <a:rPr lang="en-US" altLang="zh-TW" sz="4400" dirty="0" smtClean="0"/>
+              <a:t>Angry Runner </a:t>
+            </a:r>
+            <a:r>
+              <a:rPr lang="zh-TW" altLang="en-US" sz="4400" dirty="0" smtClean="0"/>
+              <a:t>指定運動時播放的音樂清單，或建立新的音樂清單</a:t>
+            </a:r>
+            <a:r>
+              <a:rPr lang="zh-TW" altLang="en-US" sz="4400" dirty="0" smtClean="0"/>
+              <a:t>。</a:t>
+            </a:r>
+            <a:endParaRPr lang="en-US" altLang="zh-TW" sz="4400" dirty="0" smtClean="0"/>
+          </a:p>
+          <a:p>
+            <a:r>
+              <a:rPr lang="zh-TW" altLang="en-US" sz="4400" b="1" dirty="0" smtClean="0">
+                <a:ln w="10541" cmpd="sng">
+                  <a:solidFill>
+                    <a:schemeClr val="accent4">
+                      <a:lumMod val="50000"/>
+                    </a:schemeClr>
+                  </a:solidFill>
+                  <a:prstDash val="solid"/>
+                </a:ln>
+                <a:gradFill>
+                  <a:gsLst>
+                    <a:gs pos="0">
+                      <a:schemeClr val="accent4">
+                        <a:lumMod val="40000"/>
+                        <a:lumOff val="60000"/>
+                      </a:schemeClr>
+                    </a:gs>
+                    <a:gs pos="9000">
+                      <a:schemeClr val="accent4">
+                        <a:lumMod val="60000"/>
+                        <a:lumOff val="40000"/>
+                      </a:schemeClr>
+                    </a:gs>
+                    <a:gs pos="50000">
+                      <a:schemeClr val="accent4">
+                        <a:lumMod val="75000"/>
+                      </a:schemeClr>
+                    </a:gs>
+                    <a:gs pos="79000">
+                      <a:schemeClr val="accent4">
+                        <a:lumMod val="60000"/>
+                        <a:lumOff val="40000"/>
+                      </a:schemeClr>
+                    </a:gs>
+                    <a:gs pos="100000">
+                      <a:schemeClr val="accent4">
+                        <a:lumMod val="40000"/>
+                        <a:lumOff val="60000"/>
+                      </a:schemeClr>
+                    </a:gs>
+                  </a:gsLst>
+                  <a:lin ang="5400000"/>
+                </a:gradFill>
+              </a:rPr>
+              <a:t>＊</a:t>
+            </a:r>
+            <a:r>
+              <a:rPr lang="zh-TW" altLang="en-US" sz="4400" dirty="0" smtClean="0"/>
+              <a:t> </a:t>
+            </a:r>
+            <a:r>
+              <a:rPr lang="en-US" altLang="zh-TW" sz="4400" dirty="0" smtClean="0"/>
+              <a:t>Angry Runner </a:t>
+            </a:r>
+            <a:r>
+              <a:rPr lang="zh-TW" altLang="en-US" sz="4400" dirty="0" smtClean="0"/>
+              <a:t>可以保存您的運動記錄，包括日期、運動時間、距離及速度</a:t>
+            </a:r>
+            <a:r>
+              <a:rPr lang="zh-TW" altLang="en-US" sz="4400" dirty="0" smtClean="0"/>
+              <a:t>。</a:t>
+            </a:r>
+            <a:endParaRPr lang="en-US" altLang="zh-TW" sz="4400" dirty="0" smtClean="0"/>
+          </a:p>
           <a:p>
             <a:r>
               <a:rPr lang="zh-TW" altLang="en-US" sz="4400" b="1" dirty="0" smtClean="0">
@@ -4220,500 +4623,12 @@
             </a:r>
             <a:r>
               <a:rPr lang="en-US" altLang="zh-TW" sz="4400" dirty="0" smtClean="0"/>
-              <a:t>Angry </a:t>
-            </a:r>
-            <a:r>
-              <a:rPr lang="en-US" altLang="zh-TW" sz="4400" dirty="0" smtClean="0"/>
-              <a:t>Runner </a:t>
-            </a:r>
-            <a:endParaRPr lang="en-US" altLang="zh-TW" sz="4400" dirty="0" smtClean="0"/>
-          </a:p>
-          <a:p>
+              <a:t>Angry Runner </a:t>
+            </a:r>
             <a:r>
               <a:rPr lang="zh-TW" altLang="en-US" sz="4400" dirty="0" smtClean="0"/>
-              <a:t>會</a:t>
-            </a:r>
-            <a:r>
-              <a:rPr lang="zh-TW" altLang="en-US" sz="4400" dirty="0" smtClean="0"/>
-              <a:t>將您的運動</a:t>
-            </a:r>
-            <a:r>
-              <a:rPr lang="zh-TW" altLang="en-US" sz="4400" dirty="0" smtClean="0"/>
-              <a:t>路徑</a:t>
-            </a:r>
-            <a:endParaRPr lang="en-US" altLang="zh-TW" sz="4400" dirty="0" smtClean="0"/>
-          </a:p>
-          <a:p>
-            <a:r>
-              <a:rPr lang="zh-TW" altLang="en-US" sz="4400" dirty="0" smtClean="0"/>
-              <a:t>即時</a:t>
-            </a:r>
-            <a:r>
-              <a:rPr lang="zh-TW" altLang="en-US" sz="4400" dirty="0" smtClean="0"/>
-              <a:t>顯示在地圖上</a:t>
-            </a:r>
-            <a:r>
-              <a:rPr lang="zh-TW" altLang="en-US" sz="4400" dirty="0" smtClean="0"/>
-              <a:t>。</a:t>
-            </a:r>
-            <a:endParaRPr lang="zh-TW" altLang="en-US" sz="4400" dirty="0"/>
-          </a:p>
-        </p:txBody>
-      </p:sp>
-      <p:sp>
-        <p:nvSpPr>
-          <p:cNvPr id="16" name="圓角矩形 15"/>
-          <p:cNvSpPr/>
-          <p:nvPr/>
-        </p:nvSpPr>
-        <p:spPr>
-          <a:xfrm>
-            <a:off x="14581832" y="19100427"/>
-            <a:ext cx="5112568" cy="10009112"/>
-          </a:xfrm>
-          <a:prstGeom prst="roundRect">
-            <a:avLst>
-              <a:gd name="adj" fmla="val 9343"/>
-            </a:avLst>
-          </a:prstGeom>
-          <a:noFill/>
-          <a:ln w="38100"/>
-        </p:spPr>
-        <p:style>
-          <a:lnRef idx="2">
-            <a:schemeClr val="accent1">
-              <a:shade val="50000"/>
-            </a:schemeClr>
-          </a:lnRef>
-          <a:fillRef idx="1">
-            <a:schemeClr val="accent1"/>
-          </a:fillRef>
-          <a:effectRef idx="0">
-            <a:schemeClr val="accent1"/>
-          </a:effectRef>
-          <a:fontRef idx="minor">
-            <a:schemeClr val="lt1"/>
-          </a:fontRef>
-        </p:style>
-        <p:txBody>
-          <a:bodyPr rtlCol="0" anchor="ctr"/>
-          <a:lstStyle/>
-          <a:p>
-            <a:pPr algn="ctr"/>
-            <a:endParaRPr lang="zh-TW" altLang="en-US"/>
-          </a:p>
-        </p:txBody>
-      </p:sp>
-      <p:pic>
-        <p:nvPicPr>
-          <p:cNvPr id="17" name="Picture 4" descr="C:\Documents and Settings\user\桌面\MobileProgramming\project\screenshot\device-2011-12-22-145919_gmap.png"/>
-          <p:cNvPicPr>
-            <a:picLocks noChangeAspect="1" noChangeArrowheads="1"/>
-          </p:cNvPicPr>
-          <p:nvPr/>
-        </p:nvPicPr>
-        <p:blipFill>
-          <a:blip r:embed="rId6" cstate="print"/>
-          <a:stretch>
-            <a:fillRect/>
-          </a:stretch>
-        </p:blipFill>
-        <p:spPr bwMode="auto">
-          <a:xfrm>
-            <a:off x="2052440" y="12907739"/>
-            <a:ext cx="4572000" cy="7620000"/>
-          </a:xfrm>
-          <a:prstGeom prst="rect">
-            <a:avLst/>
-          </a:prstGeom>
-          <a:noFill/>
-          <a:ln w="38100">
-            <a:solidFill>
-              <a:schemeClr val="accent2">
-                <a:lumMod val="60000"/>
-                <a:lumOff val="40000"/>
-              </a:schemeClr>
-            </a:solidFill>
-          </a:ln>
-        </p:spPr>
-      </p:pic>
-      <p:sp>
-        <p:nvSpPr>
-          <p:cNvPr id="18" name="文字方塊 17"/>
-          <p:cNvSpPr txBox="1"/>
-          <p:nvPr/>
-        </p:nvSpPr>
-        <p:spPr>
-          <a:xfrm>
-            <a:off x="972320" y="8659267"/>
-            <a:ext cx="12385376" cy="4154984"/>
-          </a:xfrm>
-          <a:prstGeom prst="rect">
-            <a:avLst/>
-          </a:prstGeom>
-          <a:ln>
-            <a:noFill/>
-          </a:ln>
-        </p:spPr>
-        <p:style>
-          <a:lnRef idx="2">
-            <a:schemeClr val="accent2"/>
-          </a:lnRef>
-          <a:fillRef idx="1">
-            <a:schemeClr val="lt1"/>
-          </a:fillRef>
-          <a:effectRef idx="0">
-            <a:schemeClr val="accent2"/>
-          </a:effectRef>
-          <a:fontRef idx="minor">
-            <a:schemeClr val="dk1"/>
-          </a:fontRef>
-        </p:style>
-        <p:txBody>
-          <a:bodyPr wrap="square" rtlCol="0">
-            <a:spAutoFit/>
-          </a:bodyPr>
-          <a:lstStyle/>
-          <a:p>
-            <a:r>
-              <a:rPr lang="zh-TW" altLang="en-US" sz="4400" b="1" dirty="0" smtClean="0">
-                <a:ln w="10541" cmpd="sng">
-                  <a:solidFill>
-                    <a:schemeClr val="accent2">
-                      <a:lumMod val="50000"/>
-                    </a:schemeClr>
-                  </a:solidFill>
-                  <a:prstDash val="solid"/>
-                </a:ln>
-                <a:gradFill>
-                  <a:gsLst>
-                    <a:gs pos="0">
-                      <a:schemeClr val="accent2">
-                        <a:lumMod val="40000"/>
-                        <a:lumOff val="60000"/>
-                      </a:schemeClr>
-                    </a:gs>
-                    <a:gs pos="9000">
-                      <a:schemeClr val="accent2">
-                        <a:lumMod val="60000"/>
-                        <a:lumOff val="40000"/>
-                      </a:schemeClr>
-                    </a:gs>
-                    <a:gs pos="50000">
-                      <a:schemeClr val="accent2">
-                        <a:lumMod val="75000"/>
-                      </a:schemeClr>
-                    </a:gs>
-                    <a:gs pos="79000">
-                      <a:schemeClr val="accent2">
-                        <a:lumMod val="60000"/>
-                        <a:lumOff val="40000"/>
-                      </a:schemeClr>
-                    </a:gs>
-                    <a:gs pos="100000">
-                      <a:schemeClr val="accent2">
-                        <a:lumMod val="40000"/>
-                        <a:lumOff val="60000"/>
-                      </a:schemeClr>
-                    </a:gs>
-                  </a:gsLst>
-                  <a:lin ang="5400000"/>
-                </a:gradFill>
-              </a:rPr>
-              <a:t>＊</a:t>
-            </a:r>
-            <a:r>
-              <a:rPr lang="zh-TW" altLang="en-US" sz="4400" dirty="0" smtClean="0"/>
-              <a:t> </a:t>
-            </a:r>
-            <a:r>
-              <a:rPr lang="en-US" altLang="zh-TW" sz="4400" dirty="0" smtClean="0"/>
-              <a:t>Angry Runner </a:t>
-            </a:r>
-            <a:r>
-              <a:rPr lang="zh-TW" altLang="en-US" sz="4400" dirty="0" smtClean="0"/>
-              <a:t>利用手機內建的 </a:t>
-            </a:r>
-            <a:r>
-              <a:rPr lang="en-US" altLang="zh-TW" sz="4400" dirty="0" smtClean="0"/>
-              <a:t>GPS </a:t>
-            </a:r>
-            <a:r>
-              <a:rPr lang="zh-TW" altLang="en-US" sz="4400" dirty="0" smtClean="0"/>
-              <a:t>即時掌握您的運動時間、距離、和速度</a:t>
-            </a:r>
-            <a:r>
-              <a:rPr lang="zh-TW" altLang="en-US" sz="4400" dirty="0" smtClean="0"/>
-              <a:t>，並</a:t>
-            </a:r>
-            <a:r>
-              <a:rPr lang="zh-TW" altLang="en-US" sz="4400" dirty="0" smtClean="0"/>
-              <a:t>即時計算卡路里消耗量</a:t>
-            </a:r>
-            <a:r>
-              <a:rPr lang="zh-TW" altLang="en-US" sz="4400" dirty="0" smtClean="0"/>
-              <a:t>。</a:t>
-            </a:r>
-            <a:endParaRPr lang="en-US" altLang="zh-TW" sz="4400" dirty="0" smtClean="0"/>
-          </a:p>
-          <a:p>
-            <a:r>
-              <a:rPr lang="zh-TW" altLang="en-US" sz="4400" b="1" dirty="0" smtClean="0">
-                <a:ln w="10541" cmpd="sng">
-                  <a:solidFill>
-                    <a:schemeClr val="accent2">
-                      <a:lumMod val="50000"/>
-                    </a:schemeClr>
-                  </a:solidFill>
-                  <a:prstDash val="solid"/>
-                </a:ln>
-                <a:gradFill>
-                  <a:gsLst>
-                    <a:gs pos="0">
-                      <a:schemeClr val="accent2">
-                        <a:lumMod val="40000"/>
-                        <a:lumOff val="60000"/>
-                      </a:schemeClr>
-                    </a:gs>
-                    <a:gs pos="9000">
-                      <a:schemeClr val="accent2">
-                        <a:lumMod val="60000"/>
-                        <a:lumOff val="40000"/>
-                      </a:schemeClr>
-                    </a:gs>
-                    <a:gs pos="50000">
-                      <a:schemeClr val="accent2">
-                        <a:lumMod val="75000"/>
-                      </a:schemeClr>
-                    </a:gs>
-                    <a:gs pos="79000">
-                      <a:schemeClr val="accent2">
-                        <a:lumMod val="60000"/>
-                        <a:lumOff val="40000"/>
-                      </a:schemeClr>
-                    </a:gs>
-                    <a:gs pos="100000">
-                      <a:schemeClr val="accent2">
-                        <a:lumMod val="40000"/>
-                        <a:lumOff val="60000"/>
-                      </a:schemeClr>
-                    </a:gs>
-                  </a:gsLst>
-                  <a:lin ang="5400000"/>
-                </a:gradFill>
-              </a:rPr>
-              <a:t>＊</a:t>
-            </a:r>
-            <a:r>
-              <a:rPr lang="zh-TW" altLang="en-US" sz="4400" b="1" dirty="0" smtClean="0">
-                <a:ln w="10541" cmpd="sng">
-                  <a:solidFill>
-                    <a:schemeClr val="accent3">
-                      <a:lumMod val="50000"/>
-                    </a:schemeClr>
-                  </a:solidFill>
-                  <a:prstDash val="solid"/>
-                </a:ln>
-                <a:gradFill>
-                  <a:gsLst>
-                    <a:gs pos="0">
-                      <a:schemeClr val="accent3">
-                        <a:lumMod val="40000"/>
-                        <a:lumOff val="60000"/>
-                      </a:schemeClr>
-                    </a:gs>
-                    <a:gs pos="9000">
-                      <a:schemeClr val="accent3">
-                        <a:lumMod val="60000"/>
-                        <a:lumOff val="40000"/>
-                      </a:schemeClr>
-                    </a:gs>
-                    <a:gs pos="50000">
-                      <a:schemeClr val="accent3">
-                        <a:lumMod val="75000"/>
-                      </a:schemeClr>
-                    </a:gs>
-                    <a:gs pos="79000">
-                      <a:schemeClr val="accent3">
-                        <a:lumMod val="60000"/>
-                        <a:lumOff val="40000"/>
-                      </a:schemeClr>
-                    </a:gs>
-                    <a:gs pos="100000">
-                      <a:schemeClr val="accent3">
-                        <a:lumMod val="40000"/>
-                        <a:lumOff val="60000"/>
-                      </a:schemeClr>
-                    </a:gs>
-                  </a:gsLst>
-                  <a:lin ang="5400000"/>
-                </a:gradFill>
-              </a:rPr>
-              <a:t> </a:t>
-            </a:r>
-            <a:r>
-              <a:rPr lang="en-US" altLang="zh-TW" sz="4400" dirty="0" smtClean="0"/>
-              <a:t>Angry Runner </a:t>
-            </a:r>
-            <a:r>
-              <a:rPr lang="zh-TW" altLang="en-US" sz="4400" dirty="0" smtClean="0"/>
-              <a:t>會在您開始運動時自動播放音樂</a:t>
-            </a:r>
-            <a:r>
-              <a:rPr lang="zh-TW" altLang="en-US" sz="4400" dirty="0" smtClean="0"/>
-              <a:t>。</a:t>
-            </a:r>
-            <a:endParaRPr lang="en-US" altLang="zh-TW" sz="4400" dirty="0" smtClean="0"/>
-          </a:p>
-          <a:p>
-            <a:r>
-              <a:rPr lang="zh-TW" altLang="en-US" sz="4400" b="1" dirty="0" smtClean="0">
-                <a:ln w="10541" cmpd="sng">
-                  <a:solidFill>
-                    <a:schemeClr val="accent2">
-                      <a:lumMod val="50000"/>
-                    </a:schemeClr>
-                  </a:solidFill>
-                  <a:prstDash val="solid"/>
-                </a:ln>
-                <a:gradFill>
-                  <a:gsLst>
-                    <a:gs pos="0">
-                      <a:schemeClr val="accent2">
-                        <a:lumMod val="40000"/>
-                        <a:lumOff val="60000"/>
-                      </a:schemeClr>
-                    </a:gs>
-                    <a:gs pos="9000">
-                      <a:schemeClr val="accent2">
-                        <a:lumMod val="60000"/>
-                        <a:lumOff val="40000"/>
-                      </a:schemeClr>
-                    </a:gs>
-                    <a:gs pos="50000">
-                      <a:schemeClr val="accent2">
-                        <a:lumMod val="75000"/>
-                      </a:schemeClr>
-                    </a:gs>
-                    <a:gs pos="79000">
-                      <a:schemeClr val="accent2">
-                        <a:lumMod val="60000"/>
-                        <a:lumOff val="40000"/>
-                      </a:schemeClr>
-                    </a:gs>
-                    <a:gs pos="100000">
-                      <a:schemeClr val="accent2">
-                        <a:lumMod val="40000"/>
-                        <a:lumOff val="60000"/>
-                      </a:schemeClr>
-                    </a:gs>
-                  </a:gsLst>
-                  <a:lin ang="5400000"/>
-                </a:gradFill>
-              </a:rPr>
-              <a:t>＊</a:t>
-            </a:r>
-            <a:r>
-              <a:rPr lang="zh-TW" altLang="en-US" sz="4400" b="1" dirty="0" smtClean="0">
-                <a:ln w="10541" cmpd="sng">
-                  <a:solidFill>
-                    <a:schemeClr val="accent3">
-                      <a:lumMod val="50000"/>
-                    </a:schemeClr>
-                  </a:solidFill>
-                  <a:prstDash val="solid"/>
-                </a:ln>
-                <a:gradFill>
-                  <a:gsLst>
-                    <a:gs pos="0">
-                      <a:schemeClr val="accent3">
-                        <a:lumMod val="40000"/>
-                        <a:lumOff val="60000"/>
-                      </a:schemeClr>
-                    </a:gs>
-                    <a:gs pos="9000">
-                      <a:schemeClr val="accent3">
-                        <a:lumMod val="60000"/>
-                        <a:lumOff val="40000"/>
-                      </a:schemeClr>
-                    </a:gs>
-                    <a:gs pos="50000">
-                      <a:schemeClr val="accent3">
-                        <a:lumMod val="75000"/>
-                      </a:schemeClr>
-                    </a:gs>
-                    <a:gs pos="79000">
-                      <a:schemeClr val="accent3">
-                        <a:lumMod val="60000"/>
-                        <a:lumOff val="40000"/>
-                      </a:schemeClr>
-                    </a:gs>
-                    <a:gs pos="100000">
-                      <a:schemeClr val="accent3">
-                        <a:lumMod val="40000"/>
-                        <a:lumOff val="60000"/>
-                      </a:schemeClr>
-                    </a:gs>
-                  </a:gsLst>
-                  <a:lin ang="5400000"/>
-                </a:gradFill>
-              </a:rPr>
-              <a:t> </a:t>
-            </a:r>
-            <a:r>
-              <a:rPr lang="en-US" altLang="zh-TW" sz="4400" dirty="0" smtClean="0"/>
-              <a:t>Angry </a:t>
-            </a:r>
-            <a:r>
-              <a:rPr lang="en-US" altLang="zh-TW" sz="4400" dirty="0" smtClean="0"/>
-              <a:t>Runner </a:t>
-            </a:r>
-            <a:r>
-              <a:rPr lang="zh-TW" altLang="en-US" sz="4400" dirty="0" smtClean="0"/>
-              <a:t>會依您運動的速度自動調整音樂的音量，提醒您保持適當地運動速度。</a:t>
-            </a:r>
-          </a:p>
-        </p:txBody>
-      </p:sp>
-      <p:sp>
-        <p:nvSpPr>
-          <p:cNvPr id="19" name="圓角矩形 18"/>
-          <p:cNvSpPr/>
-          <p:nvPr/>
-        </p:nvSpPr>
-        <p:spPr>
-          <a:xfrm>
-            <a:off x="900312" y="8731275"/>
-            <a:ext cx="12457384" cy="12097344"/>
-          </a:xfrm>
-          <a:prstGeom prst="roundRect">
-            <a:avLst>
-              <a:gd name="adj" fmla="val 5042"/>
-            </a:avLst>
-          </a:prstGeom>
-          <a:noFill/>
-          <a:ln w="38100"/>
-        </p:spPr>
-        <p:style>
-          <a:lnRef idx="2">
-            <a:schemeClr val="accent2"/>
-          </a:lnRef>
-          <a:fillRef idx="1">
-            <a:schemeClr val="lt1"/>
-          </a:fillRef>
-          <a:effectRef idx="0">
-            <a:schemeClr val="accent2"/>
-          </a:effectRef>
-          <a:fontRef idx="minor">
-            <a:schemeClr val="dk1"/>
-          </a:fontRef>
-        </p:style>
-        <p:txBody>
-          <a:bodyPr rtlCol="0" anchor="ctr"/>
-          <a:lstStyle/>
-          <a:p>
-            <a:pPr algn="ctr"/>
-            <a:endParaRPr lang="zh-TW" altLang="en-US"/>
+              <a:t>會將您的運動路徑即時顯示在地圖上。</a:t>
+            </a:r>
           </a:p>
         </p:txBody>
       </p:sp>
@@ -4726,14 +4641,14 @@
           <p:nvPr/>
         </p:nvPicPr>
         <p:blipFill>
-          <a:blip r:embed="rId7" cstate="print"/>
+          <a:blip r:embed="rId5" cstate="print"/>
           <a:stretch>
             <a:fillRect/>
           </a:stretch>
         </p:blipFill>
         <p:spPr bwMode="auto">
           <a:xfrm>
-            <a:off x="7597056" y="21260667"/>
+            <a:off x="14221792" y="6931075"/>
             <a:ext cx="4572000" cy="7620000"/>
           </a:xfrm>
           <a:prstGeom prst="rect">
@@ -4750,303 +4665,6 @@
           </a:ln>
         </p:spPr>
       </p:pic>
-      <p:sp>
-        <p:nvSpPr>
-          <p:cNvPr id="21" name="文字方塊 20"/>
-          <p:cNvSpPr txBox="1"/>
-          <p:nvPr/>
-        </p:nvSpPr>
-        <p:spPr>
-          <a:xfrm>
-            <a:off x="1548384" y="23852955"/>
-            <a:ext cx="5365104" cy="2800767"/>
-          </a:xfrm>
-          <a:prstGeom prst="rect">
-            <a:avLst/>
-          </a:prstGeom>
-          <a:ln>
-            <a:noFill/>
-          </a:ln>
-        </p:spPr>
-        <p:style>
-          <a:lnRef idx="2">
-            <a:schemeClr val="accent2"/>
-          </a:lnRef>
-          <a:fillRef idx="1">
-            <a:schemeClr val="lt1"/>
-          </a:fillRef>
-          <a:effectRef idx="0">
-            <a:schemeClr val="accent2"/>
-          </a:effectRef>
-          <a:fontRef idx="minor">
-            <a:schemeClr val="dk1"/>
-          </a:fontRef>
-        </p:style>
-        <p:txBody>
-          <a:bodyPr wrap="square" rtlCol="0">
-            <a:spAutoFit/>
-          </a:bodyPr>
-          <a:lstStyle/>
-          <a:p>
-            <a:r>
-              <a:rPr lang="zh-TW" altLang="en-US" sz="4400" b="1" dirty="0" smtClean="0">
-                <a:ln w="10541" cmpd="sng">
-                  <a:solidFill>
-                    <a:schemeClr val="accent4">
-                      <a:lumMod val="50000"/>
-                    </a:schemeClr>
-                  </a:solidFill>
-                  <a:prstDash val="solid"/>
-                </a:ln>
-                <a:gradFill>
-                  <a:gsLst>
-                    <a:gs pos="0">
-                      <a:schemeClr val="accent4">
-                        <a:lumMod val="40000"/>
-                        <a:lumOff val="60000"/>
-                      </a:schemeClr>
-                    </a:gs>
-                    <a:gs pos="9000">
-                      <a:schemeClr val="accent4">
-                        <a:lumMod val="60000"/>
-                        <a:lumOff val="40000"/>
-                      </a:schemeClr>
-                    </a:gs>
-                    <a:gs pos="50000">
-                      <a:schemeClr val="accent4">
-                        <a:lumMod val="75000"/>
-                      </a:schemeClr>
-                    </a:gs>
-                    <a:gs pos="79000">
-                      <a:schemeClr val="accent4">
-                        <a:lumMod val="60000"/>
-                        <a:lumOff val="40000"/>
-                      </a:schemeClr>
-                    </a:gs>
-                    <a:gs pos="100000">
-                      <a:schemeClr val="accent4">
-                        <a:lumMod val="40000"/>
-                        <a:lumOff val="60000"/>
-                      </a:schemeClr>
-                    </a:gs>
-                  </a:gsLst>
-                  <a:lin ang="5400000"/>
-                </a:gradFill>
-              </a:rPr>
-              <a:t>＊</a:t>
-            </a:r>
-            <a:r>
-              <a:rPr lang="zh-TW" altLang="en-US" sz="4400" dirty="0" smtClean="0"/>
-              <a:t> </a:t>
-            </a:r>
-            <a:r>
-              <a:rPr lang="en-US" altLang="zh-TW" sz="4400" dirty="0" smtClean="0"/>
-              <a:t>Angry Runner </a:t>
-            </a:r>
-            <a:r>
-              <a:rPr lang="zh-TW" altLang="en-US" sz="4400" dirty="0" smtClean="0"/>
-              <a:t>可以</a:t>
-            </a:r>
-            <a:r>
-              <a:rPr lang="zh-TW" altLang="en-US" sz="4400" dirty="0" smtClean="0"/>
-              <a:t>保存</a:t>
-            </a:r>
-            <a:r>
-              <a:rPr lang="zh-TW" altLang="en-US" sz="4400" dirty="0" smtClean="0"/>
-              <a:t>您的運動記錄，包括日期、運動時間、距離及速度。</a:t>
-            </a:r>
-            <a:endParaRPr lang="zh-TW" altLang="en-US" sz="4400" dirty="0"/>
-          </a:p>
-        </p:txBody>
-      </p:sp>
-      <p:sp>
-        <p:nvSpPr>
-          <p:cNvPr id="22" name="圓角矩形 21"/>
-          <p:cNvSpPr/>
-          <p:nvPr/>
-        </p:nvSpPr>
-        <p:spPr>
-          <a:xfrm>
-            <a:off x="1404368" y="21044643"/>
-            <a:ext cx="11161240" cy="7992888"/>
-          </a:xfrm>
-          <a:prstGeom prst="roundRect">
-            <a:avLst>
-              <a:gd name="adj" fmla="val 6658"/>
-            </a:avLst>
-          </a:prstGeom>
-          <a:noFill/>
-          <a:ln w="38100"/>
-        </p:spPr>
-        <p:style>
-          <a:lnRef idx="2">
-            <a:schemeClr val="accent4"/>
-          </a:lnRef>
-          <a:fillRef idx="1">
-            <a:schemeClr val="lt1"/>
-          </a:fillRef>
-          <a:effectRef idx="0">
-            <a:schemeClr val="accent4"/>
-          </a:effectRef>
-          <a:fontRef idx="minor">
-            <a:schemeClr val="dk1"/>
-          </a:fontRef>
-        </p:style>
-        <p:txBody>
-          <a:bodyPr rtlCol="0" anchor="ctr"/>
-          <a:lstStyle/>
-          <a:p>
-            <a:pPr algn="ctr"/>
-            <a:endParaRPr lang="zh-TW" altLang="en-US"/>
-          </a:p>
-        </p:txBody>
-      </p:sp>
-      <p:sp>
-        <p:nvSpPr>
-          <p:cNvPr id="23" name="文字方塊 22"/>
-          <p:cNvSpPr txBox="1"/>
-          <p:nvPr/>
-        </p:nvSpPr>
-        <p:spPr>
-          <a:xfrm>
-            <a:off x="13789744" y="8731275"/>
-            <a:ext cx="6552728" cy="2123658"/>
-          </a:xfrm>
-          <a:prstGeom prst="rect">
-            <a:avLst/>
-          </a:prstGeom>
-          <a:noFill/>
-        </p:spPr>
-        <p:txBody>
-          <a:bodyPr wrap="square" rtlCol="0">
-            <a:spAutoFit/>
-          </a:bodyPr>
-          <a:lstStyle/>
-          <a:p>
-            <a:r>
-              <a:rPr lang="zh-TW" altLang="en-US" sz="4400" b="1" dirty="0" smtClean="0">
-                <a:ln w="10541" cmpd="sng">
-                  <a:solidFill>
-                    <a:schemeClr val="accent3">
-                      <a:lumMod val="50000"/>
-                    </a:schemeClr>
-                  </a:solidFill>
-                  <a:prstDash val="solid"/>
-                </a:ln>
-                <a:gradFill>
-                  <a:gsLst>
-                    <a:gs pos="0">
-                      <a:schemeClr val="accent3">
-                        <a:lumMod val="40000"/>
-                        <a:lumOff val="60000"/>
-                      </a:schemeClr>
-                    </a:gs>
-                    <a:gs pos="9000">
-                      <a:schemeClr val="accent3">
-                        <a:lumMod val="60000"/>
-                        <a:lumOff val="40000"/>
-                      </a:schemeClr>
-                    </a:gs>
-                    <a:gs pos="50000">
-                      <a:schemeClr val="accent3">
-                        <a:lumMod val="75000"/>
-                      </a:schemeClr>
-                    </a:gs>
-                    <a:gs pos="79000">
-                      <a:schemeClr val="accent3">
-                        <a:lumMod val="60000"/>
-                        <a:lumOff val="40000"/>
-                      </a:schemeClr>
-                    </a:gs>
-                    <a:gs pos="100000">
-                      <a:schemeClr val="accent3">
-                        <a:lumMod val="40000"/>
-                        <a:lumOff val="60000"/>
-                      </a:schemeClr>
-                    </a:gs>
-                  </a:gsLst>
-                  <a:lin ang="5400000"/>
-                </a:gradFill>
-              </a:rPr>
-              <a:t>＊</a:t>
-            </a:r>
-            <a:r>
-              <a:rPr lang="zh-TW" altLang="en-US" sz="4400" dirty="0" smtClean="0">
-                <a:solidFill>
-                  <a:schemeClr val="dk1"/>
-                </a:solidFill>
-              </a:rPr>
-              <a:t>您</a:t>
-            </a:r>
-            <a:r>
-              <a:rPr lang="zh-TW" altLang="en-US" sz="4400" dirty="0" smtClean="0">
-                <a:solidFill>
-                  <a:schemeClr val="dk1"/>
-                </a:solidFill>
-              </a:rPr>
-              <a:t>可以在 </a:t>
-            </a:r>
-            <a:r>
-              <a:rPr lang="en-US" altLang="zh-TW" sz="4400" dirty="0" smtClean="0">
-                <a:solidFill>
-                  <a:schemeClr val="dk1"/>
-                </a:solidFill>
-              </a:rPr>
-              <a:t>Angry Runner </a:t>
-            </a:r>
-            <a:r>
-              <a:rPr lang="zh-TW" altLang="en-US" sz="4400" dirty="0" smtClean="0">
-                <a:solidFill>
-                  <a:schemeClr val="dk1"/>
-                </a:solidFill>
-              </a:rPr>
-              <a:t>指定運動時播放的音樂清單，或建立新的音樂清單。</a:t>
-            </a:r>
-          </a:p>
-        </p:txBody>
-      </p:sp>
-      <p:sp>
-        <p:nvSpPr>
-          <p:cNvPr id="24" name="圓角矩形 23"/>
-          <p:cNvSpPr/>
-          <p:nvPr/>
-        </p:nvSpPr>
-        <p:spPr>
-          <a:xfrm>
-            <a:off x="13789744" y="8731275"/>
-            <a:ext cx="6696744" cy="10153128"/>
-          </a:xfrm>
-          <a:prstGeom prst="roundRect">
-            <a:avLst>
-              <a:gd name="adj" fmla="val 9343"/>
-            </a:avLst>
-          </a:prstGeom>
-          <a:noFill/>
-          <a:ln w="38100"/>
-        </p:spPr>
-        <p:style>
-          <a:lnRef idx="2">
-            <a:schemeClr val="accent3"/>
-          </a:lnRef>
-          <a:fillRef idx="1">
-            <a:schemeClr val="lt1"/>
-          </a:fillRef>
-          <a:effectRef idx="0">
-            <a:schemeClr val="accent3"/>
-          </a:effectRef>
-          <a:fontRef idx="minor">
-            <a:schemeClr val="dk1"/>
-          </a:fontRef>
-        </p:style>
-        <p:txBody>
-          <a:bodyPr rtlCol="0" anchor="ctr"/>
-          <a:lstStyle/>
-          <a:p>
-            <a:pPr algn="ctr"/>
-            <a:endParaRPr lang="zh-TW" altLang="en-US"/>
-          </a:p>
-        </p:txBody>
-      </p:sp>
       <p:pic>
         <p:nvPicPr>
           <p:cNvPr id="25" name="Picture 4" descr="C:\Documents and Settings\user\桌面\MobileProgramming\project\screenshot\device-2011-12-22-145919_gmap.png"/>
@@ -5056,14 +4674,14 @@
           <p:nvPr/>
         </p:nvPicPr>
         <p:blipFill>
-          <a:blip r:embed="rId8" cstate="print"/>
+          <a:blip r:embed="rId6" cstate="print"/>
           <a:stretch>
             <a:fillRect/>
           </a:stretch>
         </p:blipFill>
         <p:spPr bwMode="auto">
           <a:xfrm>
-            <a:off x="7597056" y="12907739"/>
+            <a:off x="8461152" y="6931075"/>
             <a:ext cx="4572000" cy="7620000"/>
           </a:xfrm>
           <a:prstGeom prst="rect">
@@ -5072,7 +4690,7 @@
           <a:noFill/>
           <a:ln w="38100">
             <a:solidFill>
-              <a:schemeClr val="accent2">
+              <a:schemeClr val="accent3">
                 <a:lumMod val="60000"/>
                 <a:lumOff val="40000"/>
               </a:schemeClr>
@@ -5080,6 +4698,351 @@
           </a:ln>
         </p:spPr>
       </p:pic>
+      <p:grpSp>
+        <p:nvGrpSpPr>
+          <p:cNvPr id="26" name="群組 25"/>
+          <p:cNvGrpSpPr/>
+          <p:nvPr/>
+        </p:nvGrpSpPr>
+        <p:grpSpPr>
+          <a:xfrm>
+            <a:off x="11557496" y="22050183"/>
+            <a:ext cx="8074078" cy="6987348"/>
+            <a:chOff x="1498585" y="7390507"/>
+            <a:chExt cx="9082190" cy="7859773"/>
+          </a:xfrm>
+        </p:grpSpPr>
+        <p:pic>
+          <p:nvPicPr>
+            <p:cNvPr id="27" name="Picture 4"/>
+            <p:cNvPicPr>
+              <a:picLocks noChangeAspect="1" noChangeArrowheads="1"/>
+            </p:cNvPicPr>
+            <p:nvPr/>
+          </p:nvPicPr>
+          <p:blipFill>
+            <a:blip r:embed="rId7" cstate="print">
+              <a:extLst>
+                <a:ext uri="{28A0092B-C50C-407E-A947-70E740481C1C}">
+                  <a14:useLocalDpi xmlns:a14="http://schemas.microsoft.com/office/drawing/2010/main" xmlns="" val="0"/>
+                </a:ext>
+              </a:extLst>
+            </a:blip>
+            <a:stretch>
+              <a:fillRect/>
+            </a:stretch>
+          </p:blipFill>
+          <p:spPr bwMode="auto">
+            <a:xfrm>
+              <a:off x="6008775" y="7435131"/>
+              <a:ext cx="4572000" cy="3429000"/>
+            </a:xfrm>
+            <a:prstGeom prst="rect">
+              <a:avLst/>
+            </a:prstGeom>
+            <a:ln>
+              <a:noFill/>
+            </a:ln>
+            <a:effectLst>
+              <a:softEdge rad="112500"/>
+            </a:effectLst>
+            <a:extLst>
+              <a:ext uri="{909E8E84-426E-40DD-AFC4-6F175D3DCCD1}">
+                <a14:hiddenFill xmlns:a14="http://schemas.microsoft.com/office/drawing/2010/main" xmlns="">
+                  <a:solidFill>
+                    <a:srgbClr val="FFFFFF"/>
+                  </a:solidFill>
+                </a14:hiddenFill>
+              </a:ext>
+            </a:extLst>
+          </p:spPr>
+        </p:pic>
+        <p:pic>
+          <p:nvPicPr>
+            <p:cNvPr id="28" name="Picture 2"/>
+            <p:cNvPicPr>
+              <a:picLocks noChangeAspect="1" noChangeArrowheads="1"/>
+            </p:cNvPicPr>
+            <p:nvPr/>
+          </p:nvPicPr>
+          <p:blipFill rotWithShape="1">
+            <a:blip r:embed="rId8" cstate="print">
+              <a:extLst>
+                <a:ext uri="{BEBA8EAE-BF5A-486C-A8C5-ECC9F3942E4B}">
+                  <a14:imgProps xmlns:a14="http://schemas.microsoft.com/office/drawing/2010/main" xmlns="">
+                    <a14:imgLayer r:embed="rId9">
+                      <a14:imgEffect>
+                        <a14:sharpenSoften amount="50000"/>
+                      </a14:imgEffect>
+                    </a14:imgLayer>
+                  </a14:imgProps>
+                </a:ext>
+                <a:ext uri="{28A0092B-C50C-407E-A947-70E740481C1C}">
+                  <a14:useLocalDpi xmlns:a14="http://schemas.microsoft.com/office/drawing/2010/main" xmlns="" val="0"/>
+                </a:ext>
+              </a:extLst>
+            </a:blip>
+            <a:srcRect b="49206"/>
+            <a:stretch/>
+          </p:blipFill>
+          <p:spPr bwMode="auto">
+            <a:xfrm>
+              <a:off x="4136567" y="12043643"/>
+              <a:ext cx="3780000" cy="3206637"/>
+            </a:xfrm>
+            <a:prstGeom prst="rect">
+              <a:avLst/>
+            </a:prstGeom>
+            <a:ln>
+              <a:noFill/>
+            </a:ln>
+            <a:effectLst>
+              <a:outerShdw blurRad="50800" dist="50800" dir="5400000" algn="ctr" rotWithShape="0">
+                <a:srgbClr val="000000">
+                  <a:alpha val="40000"/>
+                </a:srgbClr>
+              </a:outerShdw>
+              <a:softEdge rad="112500"/>
+            </a:effectLst>
+            <a:extLst>
+              <a:ext uri="{909E8E84-426E-40DD-AFC4-6F175D3DCCD1}">
+                <a14:hiddenFill xmlns:a14="http://schemas.microsoft.com/office/drawing/2010/main" xmlns="">
+                  <a:solidFill>
+                    <a:srgbClr val="FFFFFF"/>
+                  </a:solidFill>
+                </a14:hiddenFill>
+              </a:ext>
+            </a:extLst>
+          </p:spPr>
+        </p:pic>
+        <p:pic>
+          <p:nvPicPr>
+            <p:cNvPr id="29" name="Picture 2" descr="C:\Users\user\Pictures\20111225\IMAG0038.jpg"/>
+            <p:cNvPicPr>
+              <a:picLocks noChangeAspect="1" noChangeArrowheads="1"/>
+            </p:cNvPicPr>
+            <p:nvPr/>
+          </p:nvPicPr>
+          <p:blipFill>
+            <a:blip r:embed="rId10" cstate="print">
+              <a:extLst>
+                <a:ext uri="{BEBA8EAE-BF5A-486C-A8C5-ECC9F3942E4B}">
+                  <a14:imgProps xmlns:a14="http://schemas.microsoft.com/office/drawing/2010/main" xmlns="">
+                    <a14:imgLayer r:embed="rId11">
+                      <a14:imgEffect>
+                        <a14:sharpenSoften amount="50000"/>
+                      </a14:imgEffect>
+                    </a14:imgLayer>
+                  </a14:imgProps>
+                </a:ext>
+                <a:ext uri="{28A0092B-C50C-407E-A947-70E740481C1C}">
+                  <a14:useLocalDpi xmlns:a14="http://schemas.microsoft.com/office/drawing/2010/main" xmlns="" val="0"/>
+                </a:ext>
+              </a:extLst>
+            </a:blip>
+            <a:srcRect/>
+            <a:stretch>
+              <a:fillRect/>
+            </a:stretch>
+          </p:blipFill>
+          <p:spPr bwMode="auto">
+            <a:xfrm>
+              <a:off x="7854940" y="10747499"/>
+              <a:ext cx="2694444" cy="4500000"/>
+            </a:xfrm>
+            <a:prstGeom prst="rect">
+              <a:avLst/>
+            </a:prstGeom>
+            <a:ln>
+              <a:noFill/>
+            </a:ln>
+            <a:effectLst>
+              <a:softEdge rad="112500"/>
+            </a:effectLst>
+            <a:extLst>
+              <a:ext uri="{909E8E84-426E-40DD-AFC4-6F175D3DCCD1}">
+                <a14:hiddenFill xmlns:a14="http://schemas.microsoft.com/office/drawing/2010/main" xmlns="">
+                  <a:solidFill>
+                    <a:srgbClr val="FFFFFF"/>
+                  </a:solidFill>
+                </a14:hiddenFill>
+              </a:ext>
+            </a:extLst>
+          </p:spPr>
+        </p:pic>
+        <p:pic>
+          <p:nvPicPr>
+            <p:cNvPr id="30" name="Picture 2"/>
+            <p:cNvPicPr>
+              <a:picLocks noChangeAspect="1" noChangeArrowheads="1"/>
+            </p:cNvPicPr>
+            <p:nvPr/>
+          </p:nvPicPr>
+          <p:blipFill>
+            <a:blip r:embed="rId12" cstate="print">
+              <a:extLst>
+                <a:ext uri="{BEBA8EAE-BF5A-486C-A8C5-ECC9F3942E4B}">
+                  <a14:imgProps xmlns:a14="http://schemas.microsoft.com/office/drawing/2010/main" xmlns="">
+                    <a14:imgLayer r:embed="rId13">
+                      <a14:imgEffect>
+                        <a14:sharpenSoften amount="50000"/>
+                      </a14:imgEffect>
+                    </a14:imgLayer>
+                  </a14:imgProps>
+                </a:ext>
+                <a:ext uri="{28A0092B-C50C-407E-A947-70E740481C1C}">
+                  <a14:useLocalDpi xmlns:a14="http://schemas.microsoft.com/office/drawing/2010/main" xmlns="" val="0"/>
+                </a:ext>
+              </a:extLst>
+            </a:blip>
+            <a:stretch>
+              <a:fillRect/>
+            </a:stretch>
+          </p:blipFill>
+          <p:spPr bwMode="auto">
+            <a:xfrm>
+              <a:off x="1498585" y="10716925"/>
+              <a:ext cx="2709990" cy="4525962"/>
+            </a:xfrm>
+            <a:prstGeom prst="rect">
+              <a:avLst/>
+            </a:prstGeom>
+            <a:ln>
+              <a:noFill/>
+            </a:ln>
+            <a:effectLst>
+              <a:softEdge rad="112500"/>
+            </a:effectLst>
+            <a:extLst>
+              <a:ext uri="{909E8E84-426E-40DD-AFC4-6F175D3DCCD1}">
+                <a14:hiddenFill xmlns:a14="http://schemas.microsoft.com/office/drawing/2010/main" xmlns="">
+                  <a:solidFill>
+                    <a:srgbClr val="FFFFFF"/>
+                  </a:solidFill>
+                </a14:hiddenFill>
+              </a:ext>
+            </a:extLst>
+          </p:spPr>
+        </p:pic>
+        <p:pic>
+          <p:nvPicPr>
+            <p:cNvPr id="31" name="Picture 3" descr="C:\Users\user\Desktop\381494_2731353886098_1324771147_2916343_1850278505_n.jpg"/>
+            <p:cNvPicPr>
+              <a:picLocks noChangeAspect="1" noChangeArrowheads="1"/>
+            </p:cNvPicPr>
+            <p:nvPr/>
+          </p:nvPicPr>
+          <p:blipFill>
+            <a:blip r:embed="rId14" cstate="print">
+              <a:extLst>
+                <a:ext uri="{28A0092B-C50C-407E-A947-70E740481C1C}">
+                  <a14:useLocalDpi xmlns:a14="http://schemas.microsoft.com/office/drawing/2010/main" xmlns="" val="0"/>
+                </a:ext>
+              </a:extLst>
+            </a:blip>
+            <a:srcRect/>
+            <a:stretch>
+              <a:fillRect/>
+            </a:stretch>
+          </p:blipFill>
+          <p:spPr bwMode="auto">
+            <a:xfrm>
+              <a:off x="1508783" y="7390507"/>
+              <a:ext cx="4572000" cy="3429000"/>
+            </a:xfrm>
+            <a:prstGeom prst="rect">
+              <a:avLst/>
+            </a:prstGeom>
+            <a:ln>
+              <a:noFill/>
+            </a:ln>
+            <a:effectLst>
+              <a:softEdge rad="112500"/>
+            </a:effectLst>
+            <a:extLst>
+              <a:ext uri="{909E8E84-426E-40DD-AFC4-6F175D3DCCD1}">
+                <a14:hiddenFill xmlns:a14="http://schemas.microsoft.com/office/drawing/2010/main" xmlns="">
+                  <a:solidFill>
+                    <a:srgbClr val="FFFFFF"/>
+                  </a:solidFill>
+                </a14:hiddenFill>
+              </a:ext>
+            </a:extLst>
+          </p:spPr>
+        </p:pic>
+        <p:pic>
+          <p:nvPicPr>
+            <p:cNvPr id="32" name="Picture 2" descr="C:\Users\user\Desktop\387544_2731363166330_1324771147_2916359_541190708_n.jpg"/>
+            <p:cNvPicPr>
+              <a:picLocks noChangeAspect="1" noChangeArrowheads="1"/>
+            </p:cNvPicPr>
+            <p:nvPr/>
+          </p:nvPicPr>
+          <p:blipFill>
+            <a:blip r:embed="rId15" cstate="print">
+              <a:extLst>
+                <a:ext uri="{28A0092B-C50C-407E-A947-70E740481C1C}">
+                  <a14:useLocalDpi xmlns:a14="http://schemas.microsoft.com/office/drawing/2010/main" xmlns="" val="0"/>
+                </a:ext>
+              </a:extLst>
+            </a:blip>
+            <a:srcRect/>
+            <a:stretch>
+              <a:fillRect/>
+            </a:stretch>
+          </p:blipFill>
+          <p:spPr bwMode="auto">
+            <a:xfrm>
+              <a:off x="4112991" y="9451675"/>
+              <a:ext cx="3840000" cy="2880000"/>
+            </a:xfrm>
+            <a:prstGeom prst="rect">
+              <a:avLst/>
+            </a:prstGeom>
+            <a:solidFill>
+              <a:srgbClr val="FFFFFF">
+                <a:shade val="85000"/>
+              </a:srgbClr>
+            </a:solidFill>
+            <a:ln w="190500" cap="sq">
+              <a:solidFill>
+                <a:srgbClr val="FFFFFF"/>
+              </a:solidFill>
+              <a:miter lim="800000"/>
+            </a:ln>
+            <a:effectLst>
+              <a:outerShdw blurRad="65000" dist="50800" dir="12900000" kx="195000" ky="145000" algn="tl" rotWithShape="0">
+                <a:srgbClr val="000000">
+                  <a:alpha val="30000"/>
+                </a:srgbClr>
+              </a:outerShdw>
+            </a:effectLst>
+            <a:scene3d>
+              <a:camera prst="orthographicFront">
+                <a:rot lat="0" lon="0" rev="360000"/>
+              </a:camera>
+              <a:lightRig rig="twoPt" dir="t">
+                <a:rot lat="0" lon="0" rev="7200000"/>
+              </a:lightRig>
+            </a:scene3d>
+            <a:sp3d contourW="12700">
+              <a:bevelT w="25400" h="19050"/>
+              <a:contourClr>
+                <a:srgbClr val="969696"/>
+              </a:contourClr>
+            </a:sp3d>
+            <a:extLst>
+              <a:ext uri="{909E8E84-426E-40DD-AFC4-6F175D3DCCD1}">
+                <a14:hiddenFill xmlns:a14="http://schemas.microsoft.com/office/drawing/2010/main" xmlns="">
+                  <a:solidFill>
+                    <a:srgbClr val="FFFFFF"/>
+                  </a:solidFill>
+                </a14:hiddenFill>
+              </a:ext>
+            </a:extLst>
+          </p:spPr>
+        </p:pic>
+      </p:grpSp>
     </p:spTree>
   </p:cSld>
   <p:clrMapOvr>

</xml_diff>

<commit_message>
Poster version 2.5 (reorganize, 需要畫新框)
</commit_message>
<xml_diff>
--- a/poster.pptx
+++ b/poster.pptx
@@ -3986,7 +3986,7 @@
         </p:nvSpPr>
         <p:spPr>
           <a:xfrm>
-            <a:off x="1980432" y="23708939"/>
+            <a:off x="1260352" y="23708939"/>
             <a:ext cx="8136904" cy="3785652"/>
           </a:xfrm>
           <a:prstGeom prst="rect">
@@ -4077,7 +4077,7 @@
         </p:blipFill>
         <p:spPr bwMode="auto">
           <a:xfrm>
-            <a:off x="2700512" y="6931075"/>
+            <a:off x="15445928" y="7003083"/>
             <a:ext cx="4572000" cy="7620000"/>
           </a:xfrm>
           <a:prstGeom prst="rect">
@@ -4094,544 +4094,6 @@
           </a:ln>
         </p:spPr>
       </p:pic>
-      <p:sp>
-        <p:nvSpPr>
-          <p:cNvPr id="18" name="文字方塊 17"/>
-          <p:cNvSpPr txBox="1"/>
-          <p:nvPr/>
-        </p:nvSpPr>
-        <p:spPr>
-          <a:xfrm>
-            <a:off x="1980432" y="14923963"/>
-            <a:ext cx="17929992" cy="6863417"/>
-          </a:xfrm>
-          <a:prstGeom prst="rect">
-            <a:avLst/>
-          </a:prstGeom>
-          <a:ln>
-            <a:noFill/>
-          </a:ln>
-        </p:spPr>
-        <p:style>
-          <a:lnRef idx="2">
-            <a:schemeClr val="accent2"/>
-          </a:lnRef>
-          <a:fillRef idx="1">
-            <a:schemeClr val="lt1"/>
-          </a:fillRef>
-          <a:effectRef idx="0">
-            <a:schemeClr val="accent2"/>
-          </a:effectRef>
-          <a:fontRef idx="minor">
-            <a:schemeClr val="dk1"/>
-          </a:fontRef>
-        </p:style>
-        <p:txBody>
-          <a:bodyPr wrap="square" rtlCol="0">
-            <a:spAutoFit/>
-          </a:bodyPr>
-          <a:lstStyle/>
-          <a:p>
-            <a:r>
-              <a:rPr lang="zh-TW" altLang="en-US" sz="4400" b="1" dirty="0" smtClean="0">
-                <a:ln w="10541" cmpd="sng">
-                  <a:solidFill>
-                    <a:schemeClr val="accent2">
-                      <a:lumMod val="50000"/>
-                    </a:schemeClr>
-                  </a:solidFill>
-                  <a:prstDash val="solid"/>
-                </a:ln>
-                <a:gradFill>
-                  <a:gsLst>
-                    <a:gs pos="0">
-                      <a:schemeClr val="accent2">
-                        <a:lumMod val="40000"/>
-                        <a:lumOff val="60000"/>
-                      </a:schemeClr>
-                    </a:gs>
-                    <a:gs pos="9000">
-                      <a:schemeClr val="accent2">
-                        <a:lumMod val="60000"/>
-                        <a:lumOff val="40000"/>
-                      </a:schemeClr>
-                    </a:gs>
-                    <a:gs pos="50000">
-                      <a:schemeClr val="accent2">
-                        <a:lumMod val="75000"/>
-                      </a:schemeClr>
-                    </a:gs>
-                    <a:gs pos="79000">
-                      <a:schemeClr val="accent2">
-                        <a:lumMod val="60000"/>
-                        <a:lumOff val="40000"/>
-                      </a:schemeClr>
-                    </a:gs>
-                    <a:gs pos="100000">
-                      <a:schemeClr val="accent2">
-                        <a:lumMod val="40000"/>
-                        <a:lumOff val="60000"/>
-                      </a:schemeClr>
-                    </a:gs>
-                  </a:gsLst>
-                  <a:lin ang="5400000"/>
-                </a:gradFill>
-              </a:rPr>
-              <a:t>＊</a:t>
-            </a:r>
-            <a:r>
-              <a:rPr lang="zh-TW" altLang="en-US" sz="4400" dirty="0" smtClean="0"/>
-              <a:t> </a:t>
-            </a:r>
-            <a:r>
-              <a:rPr lang="en-US" altLang="zh-TW" sz="4400" dirty="0" smtClean="0"/>
-              <a:t>Angry Runner </a:t>
-            </a:r>
-            <a:r>
-              <a:rPr lang="zh-TW" altLang="en-US" sz="4400" dirty="0" smtClean="0"/>
-              <a:t>利用手機內建的 </a:t>
-            </a:r>
-            <a:r>
-              <a:rPr lang="en-US" altLang="zh-TW" sz="4400" dirty="0" smtClean="0"/>
-              <a:t>GPS </a:t>
-            </a:r>
-            <a:r>
-              <a:rPr lang="zh-TW" altLang="en-US" sz="4400" dirty="0" smtClean="0"/>
-              <a:t>即時掌握您的運動時間、距離、和速度</a:t>
-            </a:r>
-            <a:r>
-              <a:rPr lang="zh-TW" altLang="en-US" sz="4400" dirty="0" smtClean="0"/>
-              <a:t>，並</a:t>
-            </a:r>
-            <a:r>
-              <a:rPr lang="zh-TW" altLang="en-US" sz="4400" dirty="0" smtClean="0"/>
-              <a:t>即時計算卡路里消耗量</a:t>
-            </a:r>
-            <a:r>
-              <a:rPr lang="zh-TW" altLang="en-US" sz="4400" dirty="0" smtClean="0"/>
-              <a:t>。</a:t>
-            </a:r>
-            <a:endParaRPr lang="en-US" altLang="zh-TW" sz="4400" dirty="0" smtClean="0"/>
-          </a:p>
-          <a:p>
-            <a:r>
-              <a:rPr lang="zh-TW" altLang="en-US" sz="4400" b="1" dirty="0" smtClean="0">
-                <a:ln w="10541" cmpd="sng">
-                  <a:solidFill>
-                    <a:schemeClr val="accent2">
-                      <a:lumMod val="50000"/>
-                    </a:schemeClr>
-                  </a:solidFill>
-                  <a:prstDash val="solid"/>
-                </a:ln>
-                <a:gradFill>
-                  <a:gsLst>
-                    <a:gs pos="0">
-                      <a:schemeClr val="accent2">
-                        <a:lumMod val="40000"/>
-                        <a:lumOff val="60000"/>
-                      </a:schemeClr>
-                    </a:gs>
-                    <a:gs pos="9000">
-                      <a:schemeClr val="accent2">
-                        <a:lumMod val="60000"/>
-                        <a:lumOff val="40000"/>
-                      </a:schemeClr>
-                    </a:gs>
-                    <a:gs pos="50000">
-                      <a:schemeClr val="accent2">
-                        <a:lumMod val="75000"/>
-                      </a:schemeClr>
-                    </a:gs>
-                    <a:gs pos="79000">
-                      <a:schemeClr val="accent2">
-                        <a:lumMod val="60000"/>
-                        <a:lumOff val="40000"/>
-                      </a:schemeClr>
-                    </a:gs>
-                    <a:gs pos="100000">
-                      <a:schemeClr val="accent2">
-                        <a:lumMod val="40000"/>
-                        <a:lumOff val="60000"/>
-                      </a:schemeClr>
-                    </a:gs>
-                  </a:gsLst>
-                  <a:lin ang="5400000"/>
-                </a:gradFill>
-              </a:rPr>
-              <a:t>＊</a:t>
-            </a:r>
-            <a:r>
-              <a:rPr lang="zh-TW" altLang="en-US" sz="4400" b="1" dirty="0" smtClean="0">
-                <a:ln w="10541" cmpd="sng">
-                  <a:solidFill>
-                    <a:schemeClr val="accent3">
-                      <a:lumMod val="50000"/>
-                    </a:schemeClr>
-                  </a:solidFill>
-                  <a:prstDash val="solid"/>
-                </a:ln>
-                <a:gradFill>
-                  <a:gsLst>
-                    <a:gs pos="0">
-                      <a:schemeClr val="accent3">
-                        <a:lumMod val="40000"/>
-                        <a:lumOff val="60000"/>
-                      </a:schemeClr>
-                    </a:gs>
-                    <a:gs pos="9000">
-                      <a:schemeClr val="accent3">
-                        <a:lumMod val="60000"/>
-                        <a:lumOff val="40000"/>
-                      </a:schemeClr>
-                    </a:gs>
-                    <a:gs pos="50000">
-                      <a:schemeClr val="accent3">
-                        <a:lumMod val="75000"/>
-                      </a:schemeClr>
-                    </a:gs>
-                    <a:gs pos="79000">
-                      <a:schemeClr val="accent3">
-                        <a:lumMod val="60000"/>
-                        <a:lumOff val="40000"/>
-                      </a:schemeClr>
-                    </a:gs>
-                    <a:gs pos="100000">
-                      <a:schemeClr val="accent3">
-                        <a:lumMod val="40000"/>
-                        <a:lumOff val="60000"/>
-                      </a:schemeClr>
-                    </a:gs>
-                  </a:gsLst>
-                  <a:lin ang="5400000"/>
-                </a:gradFill>
-              </a:rPr>
-              <a:t> </a:t>
-            </a:r>
-            <a:r>
-              <a:rPr lang="en-US" altLang="zh-TW" sz="4400" dirty="0" smtClean="0"/>
-              <a:t>Angry Runner </a:t>
-            </a:r>
-            <a:r>
-              <a:rPr lang="zh-TW" altLang="en-US" sz="4400" dirty="0" smtClean="0"/>
-              <a:t>會在您開始運動時自動播放音樂</a:t>
-            </a:r>
-            <a:r>
-              <a:rPr lang="zh-TW" altLang="en-US" sz="4400" dirty="0" smtClean="0"/>
-              <a:t>。</a:t>
-            </a:r>
-            <a:endParaRPr lang="en-US" altLang="zh-TW" sz="4400" dirty="0" smtClean="0"/>
-          </a:p>
-          <a:p>
-            <a:r>
-              <a:rPr lang="zh-TW" altLang="en-US" sz="4400" b="1" dirty="0" smtClean="0">
-                <a:ln w="10541" cmpd="sng">
-                  <a:solidFill>
-                    <a:schemeClr val="accent2">
-                      <a:lumMod val="50000"/>
-                    </a:schemeClr>
-                  </a:solidFill>
-                  <a:prstDash val="solid"/>
-                </a:ln>
-                <a:gradFill>
-                  <a:gsLst>
-                    <a:gs pos="0">
-                      <a:schemeClr val="accent2">
-                        <a:lumMod val="40000"/>
-                        <a:lumOff val="60000"/>
-                      </a:schemeClr>
-                    </a:gs>
-                    <a:gs pos="9000">
-                      <a:schemeClr val="accent2">
-                        <a:lumMod val="60000"/>
-                        <a:lumOff val="40000"/>
-                      </a:schemeClr>
-                    </a:gs>
-                    <a:gs pos="50000">
-                      <a:schemeClr val="accent2">
-                        <a:lumMod val="75000"/>
-                      </a:schemeClr>
-                    </a:gs>
-                    <a:gs pos="79000">
-                      <a:schemeClr val="accent2">
-                        <a:lumMod val="60000"/>
-                        <a:lumOff val="40000"/>
-                      </a:schemeClr>
-                    </a:gs>
-                    <a:gs pos="100000">
-                      <a:schemeClr val="accent2">
-                        <a:lumMod val="40000"/>
-                        <a:lumOff val="60000"/>
-                      </a:schemeClr>
-                    </a:gs>
-                  </a:gsLst>
-                  <a:lin ang="5400000"/>
-                </a:gradFill>
-              </a:rPr>
-              <a:t>＊</a:t>
-            </a:r>
-            <a:r>
-              <a:rPr lang="zh-TW" altLang="en-US" sz="4400" b="1" dirty="0" smtClean="0">
-                <a:ln w="10541" cmpd="sng">
-                  <a:solidFill>
-                    <a:schemeClr val="accent3">
-                      <a:lumMod val="50000"/>
-                    </a:schemeClr>
-                  </a:solidFill>
-                  <a:prstDash val="solid"/>
-                </a:ln>
-                <a:gradFill>
-                  <a:gsLst>
-                    <a:gs pos="0">
-                      <a:schemeClr val="accent3">
-                        <a:lumMod val="40000"/>
-                        <a:lumOff val="60000"/>
-                      </a:schemeClr>
-                    </a:gs>
-                    <a:gs pos="9000">
-                      <a:schemeClr val="accent3">
-                        <a:lumMod val="60000"/>
-                        <a:lumOff val="40000"/>
-                      </a:schemeClr>
-                    </a:gs>
-                    <a:gs pos="50000">
-                      <a:schemeClr val="accent3">
-                        <a:lumMod val="75000"/>
-                      </a:schemeClr>
-                    </a:gs>
-                    <a:gs pos="79000">
-                      <a:schemeClr val="accent3">
-                        <a:lumMod val="60000"/>
-                        <a:lumOff val="40000"/>
-                      </a:schemeClr>
-                    </a:gs>
-                    <a:gs pos="100000">
-                      <a:schemeClr val="accent3">
-                        <a:lumMod val="40000"/>
-                        <a:lumOff val="60000"/>
-                      </a:schemeClr>
-                    </a:gs>
-                  </a:gsLst>
-                  <a:lin ang="5400000"/>
-                </a:gradFill>
-              </a:rPr>
-              <a:t> </a:t>
-            </a:r>
-            <a:r>
-              <a:rPr lang="en-US" altLang="zh-TW" sz="4400" dirty="0" smtClean="0"/>
-              <a:t>Angry </a:t>
-            </a:r>
-            <a:r>
-              <a:rPr lang="en-US" altLang="zh-TW" sz="4400" dirty="0" smtClean="0"/>
-              <a:t>Runner </a:t>
-            </a:r>
-            <a:r>
-              <a:rPr lang="zh-TW" altLang="en-US" sz="4400" dirty="0" smtClean="0"/>
-              <a:t>會依您運動的速度自動調整音樂的音量，提醒您保持適當地運動速度</a:t>
-            </a:r>
-            <a:r>
-              <a:rPr lang="zh-TW" altLang="en-US" sz="4400" dirty="0" smtClean="0"/>
-              <a:t>。</a:t>
-            </a:r>
-            <a:endParaRPr lang="en-US" altLang="zh-TW" sz="4400" dirty="0" smtClean="0"/>
-          </a:p>
-          <a:p>
-            <a:r>
-              <a:rPr lang="zh-TW" altLang="en-US" sz="4400" b="1" dirty="0" smtClean="0">
-                <a:ln w="10541" cmpd="sng">
-                  <a:solidFill>
-                    <a:schemeClr val="accent3">
-                      <a:lumMod val="50000"/>
-                    </a:schemeClr>
-                  </a:solidFill>
-                  <a:prstDash val="solid"/>
-                </a:ln>
-                <a:gradFill>
-                  <a:gsLst>
-                    <a:gs pos="0">
-                      <a:schemeClr val="accent3">
-                        <a:lumMod val="40000"/>
-                        <a:lumOff val="60000"/>
-                      </a:schemeClr>
-                    </a:gs>
-                    <a:gs pos="9000">
-                      <a:schemeClr val="accent3">
-                        <a:lumMod val="60000"/>
-                        <a:lumOff val="40000"/>
-                      </a:schemeClr>
-                    </a:gs>
-                    <a:gs pos="50000">
-                      <a:schemeClr val="accent3">
-                        <a:lumMod val="75000"/>
-                      </a:schemeClr>
-                    </a:gs>
-                    <a:gs pos="79000">
-                      <a:schemeClr val="accent3">
-                        <a:lumMod val="60000"/>
-                        <a:lumOff val="40000"/>
-                      </a:schemeClr>
-                    </a:gs>
-                    <a:gs pos="100000">
-                      <a:schemeClr val="accent3">
-                        <a:lumMod val="40000"/>
-                        <a:lumOff val="60000"/>
-                      </a:schemeClr>
-                    </a:gs>
-                  </a:gsLst>
-                  <a:lin ang="5400000"/>
-                </a:gradFill>
-              </a:rPr>
-              <a:t>＊</a:t>
-            </a:r>
-            <a:r>
-              <a:rPr lang="zh-TW" altLang="en-US" sz="4400" dirty="0" smtClean="0"/>
-              <a:t>您可以在 </a:t>
-            </a:r>
-            <a:r>
-              <a:rPr lang="en-US" altLang="zh-TW" sz="4400" dirty="0" smtClean="0"/>
-              <a:t>Angry Runner </a:t>
-            </a:r>
-            <a:r>
-              <a:rPr lang="zh-TW" altLang="en-US" sz="4400" dirty="0" smtClean="0"/>
-              <a:t>指定運動時播放的音樂清單，或建立新的音樂清單</a:t>
-            </a:r>
-            <a:r>
-              <a:rPr lang="zh-TW" altLang="en-US" sz="4400" dirty="0" smtClean="0"/>
-              <a:t>。</a:t>
-            </a:r>
-            <a:endParaRPr lang="en-US" altLang="zh-TW" sz="4400" dirty="0" smtClean="0"/>
-          </a:p>
-          <a:p>
-            <a:r>
-              <a:rPr lang="zh-TW" altLang="en-US" sz="4400" b="1" dirty="0" smtClean="0">
-                <a:ln w="10541" cmpd="sng">
-                  <a:solidFill>
-                    <a:schemeClr val="accent4">
-                      <a:lumMod val="50000"/>
-                    </a:schemeClr>
-                  </a:solidFill>
-                  <a:prstDash val="solid"/>
-                </a:ln>
-                <a:gradFill>
-                  <a:gsLst>
-                    <a:gs pos="0">
-                      <a:schemeClr val="accent4">
-                        <a:lumMod val="40000"/>
-                        <a:lumOff val="60000"/>
-                      </a:schemeClr>
-                    </a:gs>
-                    <a:gs pos="9000">
-                      <a:schemeClr val="accent4">
-                        <a:lumMod val="60000"/>
-                        <a:lumOff val="40000"/>
-                      </a:schemeClr>
-                    </a:gs>
-                    <a:gs pos="50000">
-                      <a:schemeClr val="accent4">
-                        <a:lumMod val="75000"/>
-                      </a:schemeClr>
-                    </a:gs>
-                    <a:gs pos="79000">
-                      <a:schemeClr val="accent4">
-                        <a:lumMod val="60000"/>
-                        <a:lumOff val="40000"/>
-                      </a:schemeClr>
-                    </a:gs>
-                    <a:gs pos="100000">
-                      <a:schemeClr val="accent4">
-                        <a:lumMod val="40000"/>
-                        <a:lumOff val="60000"/>
-                      </a:schemeClr>
-                    </a:gs>
-                  </a:gsLst>
-                  <a:lin ang="5400000"/>
-                </a:gradFill>
-              </a:rPr>
-              <a:t>＊</a:t>
-            </a:r>
-            <a:r>
-              <a:rPr lang="zh-TW" altLang="en-US" sz="4400" dirty="0" smtClean="0"/>
-              <a:t> </a:t>
-            </a:r>
-            <a:r>
-              <a:rPr lang="en-US" altLang="zh-TW" sz="4400" dirty="0" smtClean="0"/>
-              <a:t>Angry Runner </a:t>
-            </a:r>
-            <a:r>
-              <a:rPr lang="zh-TW" altLang="en-US" sz="4400" dirty="0" smtClean="0"/>
-              <a:t>可以保存您的運動記錄，包括日期、運動時間、距離及速度</a:t>
-            </a:r>
-            <a:r>
-              <a:rPr lang="zh-TW" altLang="en-US" sz="4400" dirty="0" smtClean="0"/>
-              <a:t>。</a:t>
-            </a:r>
-            <a:endParaRPr lang="en-US" altLang="zh-TW" sz="4400" dirty="0" smtClean="0"/>
-          </a:p>
-          <a:p>
-            <a:r>
-              <a:rPr lang="zh-TW" altLang="en-US" sz="4400" b="1" dirty="0" smtClean="0">
-                <a:ln w="10541" cmpd="sng">
-                  <a:solidFill>
-                    <a:schemeClr val="accent1">
-                      <a:shade val="88000"/>
-                      <a:satMod val="110000"/>
-                    </a:schemeClr>
-                  </a:solidFill>
-                  <a:prstDash val="solid"/>
-                </a:ln>
-                <a:gradFill>
-                  <a:gsLst>
-                    <a:gs pos="0">
-                      <a:schemeClr val="accent1">
-                        <a:tint val="40000"/>
-                        <a:satMod val="250000"/>
-                      </a:schemeClr>
-                    </a:gs>
-                    <a:gs pos="9000">
-                      <a:schemeClr val="accent1">
-                        <a:tint val="52000"/>
-                        <a:satMod val="300000"/>
-                      </a:schemeClr>
-                    </a:gs>
-                    <a:gs pos="50000">
-                      <a:schemeClr val="accent1">
-                        <a:shade val="20000"/>
-                        <a:satMod val="300000"/>
-                      </a:schemeClr>
-                    </a:gs>
-                    <a:gs pos="79000">
-                      <a:schemeClr val="accent1">
-                        <a:tint val="52000"/>
-                        <a:satMod val="300000"/>
-                      </a:schemeClr>
-                    </a:gs>
-                    <a:gs pos="100000">
-                      <a:schemeClr val="accent1">
-                        <a:tint val="40000"/>
-                        <a:satMod val="250000"/>
-                      </a:schemeClr>
-                    </a:gs>
-                  </a:gsLst>
-                  <a:lin ang="5400000"/>
-                </a:gradFill>
-              </a:rPr>
-              <a:t>＊</a:t>
-            </a:r>
-            <a:r>
-              <a:rPr lang="zh-TW" altLang="en-US" sz="4400" dirty="0" smtClean="0"/>
-              <a:t> </a:t>
-            </a:r>
-            <a:r>
-              <a:rPr lang="en-US" altLang="zh-TW" sz="4400" dirty="0" smtClean="0"/>
-              <a:t>Angry Runner </a:t>
-            </a:r>
-            <a:r>
-              <a:rPr lang="zh-TW" altLang="en-US" sz="4400" dirty="0" smtClean="0"/>
-              <a:t>會將您的運動路徑即時顯示在地圖上。</a:t>
-            </a:r>
-          </a:p>
-        </p:txBody>
-      </p:sp>
       <p:pic>
         <p:nvPicPr>
           <p:cNvPr id="20" name="Picture 4" descr="C:\Documents and Settings\user\桌面\MobileProgramming\project\screenshot\device-2011-12-22-145919_gmap.png"/>
@@ -4648,7 +4110,7 @@
         </p:blipFill>
         <p:spPr bwMode="auto">
           <a:xfrm>
-            <a:off x="14221792" y="6931075"/>
+            <a:off x="9325248" y="14072715"/>
             <a:ext cx="4572000" cy="7620000"/>
           </a:xfrm>
           <a:prstGeom prst="rect">
@@ -4681,7 +4143,7 @@
         </p:blipFill>
         <p:spPr bwMode="auto">
           <a:xfrm>
-            <a:off x="8461152" y="6931075"/>
+            <a:off x="1260352" y="10315451"/>
             <a:ext cx="4572000" cy="7620000"/>
           </a:xfrm>
           <a:prstGeom prst="rect">
@@ -4706,7 +4168,7 @@
         </p:nvGrpSpPr>
         <p:grpSpPr>
           <a:xfrm>
-            <a:off x="11557496" y="22050183"/>
+            <a:off x="11943850" y="22050183"/>
             <a:ext cx="8074078" cy="6987348"/>
             <a:chOff x="1498585" y="7390507"/>
             <a:chExt cx="9082190" cy="7859773"/>
@@ -5043,6 +4505,756 @@
           </p:spPr>
         </p:pic>
       </p:grpSp>
+      <p:sp>
+        <p:nvSpPr>
+          <p:cNvPr id="33" name="文字方塊 32"/>
+          <p:cNvSpPr txBox="1"/>
+          <p:nvPr/>
+        </p:nvSpPr>
+        <p:spPr>
+          <a:xfrm>
+            <a:off x="1332360" y="7003083"/>
+            <a:ext cx="13321480" cy="2800767"/>
+          </a:xfrm>
+          <a:prstGeom prst="rect">
+            <a:avLst/>
+          </a:prstGeom>
+          <a:noFill/>
+        </p:spPr>
+        <p:txBody>
+          <a:bodyPr wrap="square" rtlCol="0">
+            <a:spAutoFit/>
+          </a:bodyPr>
+          <a:lstStyle/>
+          <a:p>
+            <a:r>
+              <a:rPr lang="zh-TW" altLang="en-US" sz="4400" b="1" dirty="0" smtClean="0">
+                <a:ln w="10541" cmpd="sng">
+                  <a:solidFill>
+                    <a:schemeClr val="accent2">
+                      <a:lumMod val="50000"/>
+                    </a:schemeClr>
+                  </a:solidFill>
+                  <a:prstDash val="solid"/>
+                </a:ln>
+                <a:gradFill>
+                  <a:gsLst>
+                    <a:gs pos="0">
+                      <a:schemeClr val="accent2">
+                        <a:lumMod val="40000"/>
+                        <a:lumOff val="60000"/>
+                      </a:schemeClr>
+                    </a:gs>
+                    <a:gs pos="9000">
+                      <a:schemeClr val="accent2">
+                        <a:lumMod val="60000"/>
+                        <a:lumOff val="40000"/>
+                      </a:schemeClr>
+                    </a:gs>
+                    <a:gs pos="50000">
+                      <a:schemeClr val="accent2">
+                        <a:lumMod val="75000"/>
+                      </a:schemeClr>
+                    </a:gs>
+                    <a:gs pos="79000">
+                      <a:schemeClr val="accent2">
+                        <a:lumMod val="60000"/>
+                        <a:lumOff val="40000"/>
+                      </a:schemeClr>
+                    </a:gs>
+                    <a:gs pos="100000">
+                      <a:schemeClr val="accent2">
+                        <a:lumMod val="40000"/>
+                        <a:lumOff val="60000"/>
+                      </a:schemeClr>
+                    </a:gs>
+                  </a:gsLst>
+                  <a:lin ang="5400000"/>
+                </a:gradFill>
+              </a:rPr>
+              <a:t>＊</a:t>
+            </a:r>
+            <a:r>
+              <a:rPr lang="zh-TW" altLang="en-US" sz="4400" dirty="0" smtClean="0"/>
+              <a:t> </a:t>
+            </a:r>
+            <a:r>
+              <a:rPr lang="en-US" altLang="zh-TW" sz="4400" dirty="0" smtClean="0"/>
+              <a:t>Angry Runner </a:t>
+            </a:r>
+            <a:r>
+              <a:rPr lang="zh-TW" altLang="en-US" sz="4400" dirty="0" smtClean="0"/>
+              <a:t>利用手機內建的 </a:t>
+            </a:r>
+            <a:r>
+              <a:rPr lang="en-US" altLang="zh-TW" sz="4400" dirty="0" smtClean="0"/>
+              <a:t>GPS </a:t>
+            </a:r>
+            <a:r>
+              <a:rPr lang="zh-TW" altLang="en-US" sz="4400" dirty="0" smtClean="0"/>
+              <a:t>即時掌握您的運動時間、距離、和速度，並即時計算卡路里消耗量</a:t>
+            </a:r>
+            <a:r>
+              <a:rPr lang="zh-TW" altLang="en-US" sz="4400" dirty="0" smtClean="0"/>
+              <a:t>。</a:t>
+            </a:r>
+            <a:endParaRPr lang="en-US" altLang="zh-TW" sz="4400" dirty="0" smtClean="0"/>
+          </a:p>
+          <a:p>
+            <a:r>
+              <a:rPr lang="zh-TW" altLang="en-US" sz="4400" b="1" dirty="0" smtClean="0">
+                <a:ln w="10541" cmpd="sng">
+                  <a:solidFill>
+                    <a:schemeClr val="accent2">
+                      <a:lumMod val="50000"/>
+                    </a:schemeClr>
+                  </a:solidFill>
+                  <a:prstDash val="solid"/>
+                </a:ln>
+                <a:gradFill>
+                  <a:gsLst>
+                    <a:gs pos="0">
+                      <a:schemeClr val="accent2">
+                        <a:lumMod val="40000"/>
+                        <a:lumOff val="60000"/>
+                      </a:schemeClr>
+                    </a:gs>
+                    <a:gs pos="9000">
+                      <a:schemeClr val="accent2">
+                        <a:lumMod val="60000"/>
+                        <a:lumOff val="40000"/>
+                      </a:schemeClr>
+                    </a:gs>
+                    <a:gs pos="50000">
+                      <a:schemeClr val="accent2">
+                        <a:lumMod val="75000"/>
+                      </a:schemeClr>
+                    </a:gs>
+                    <a:gs pos="79000">
+                      <a:schemeClr val="accent2">
+                        <a:lumMod val="60000"/>
+                        <a:lumOff val="40000"/>
+                      </a:schemeClr>
+                    </a:gs>
+                    <a:gs pos="100000">
+                      <a:schemeClr val="accent2">
+                        <a:lumMod val="40000"/>
+                        <a:lumOff val="60000"/>
+                      </a:schemeClr>
+                    </a:gs>
+                  </a:gsLst>
+                  <a:lin ang="5400000"/>
+                </a:gradFill>
+              </a:rPr>
+              <a:t>＊</a:t>
+            </a:r>
+            <a:r>
+              <a:rPr lang="zh-TW" altLang="en-US" sz="4400" b="1" dirty="0" smtClean="0">
+                <a:ln w="10541" cmpd="sng">
+                  <a:solidFill>
+                    <a:schemeClr val="accent3">
+                      <a:lumMod val="50000"/>
+                    </a:schemeClr>
+                  </a:solidFill>
+                  <a:prstDash val="solid"/>
+                </a:ln>
+                <a:gradFill>
+                  <a:gsLst>
+                    <a:gs pos="0">
+                      <a:schemeClr val="accent3">
+                        <a:lumMod val="40000"/>
+                        <a:lumOff val="60000"/>
+                      </a:schemeClr>
+                    </a:gs>
+                    <a:gs pos="9000">
+                      <a:schemeClr val="accent3">
+                        <a:lumMod val="60000"/>
+                        <a:lumOff val="40000"/>
+                      </a:schemeClr>
+                    </a:gs>
+                    <a:gs pos="50000">
+                      <a:schemeClr val="accent3">
+                        <a:lumMod val="75000"/>
+                      </a:schemeClr>
+                    </a:gs>
+                    <a:gs pos="79000">
+                      <a:schemeClr val="accent3">
+                        <a:lumMod val="60000"/>
+                        <a:lumOff val="40000"/>
+                      </a:schemeClr>
+                    </a:gs>
+                    <a:gs pos="100000">
+                      <a:schemeClr val="accent3">
+                        <a:lumMod val="40000"/>
+                        <a:lumOff val="60000"/>
+                      </a:schemeClr>
+                    </a:gs>
+                  </a:gsLst>
+                  <a:lin ang="5400000"/>
+                </a:gradFill>
+              </a:rPr>
+              <a:t> </a:t>
+            </a:r>
+            <a:r>
+              <a:rPr lang="en-US" altLang="zh-TW" sz="4400" dirty="0" smtClean="0"/>
+              <a:t>Angry Runner </a:t>
+            </a:r>
+            <a:r>
+              <a:rPr lang="zh-TW" altLang="en-US" sz="4400" dirty="0" smtClean="0"/>
+              <a:t>會依您運動的速度自動調整音樂的音量，提醒您保持適當地運動速度。</a:t>
+            </a:r>
+            <a:endParaRPr lang="zh-TW" altLang="en-US" sz="4400" dirty="0"/>
+          </a:p>
+        </p:txBody>
+      </p:sp>
+      <p:sp>
+        <p:nvSpPr>
+          <p:cNvPr id="34" name="圓角矩形 33"/>
+          <p:cNvSpPr/>
+          <p:nvPr/>
+        </p:nvSpPr>
+        <p:spPr>
+          <a:xfrm>
+            <a:off x="1260352" y="7003083"/>
+            <a:ext cx="13393488" cy="2808312"/>
+          </a:xfrm>
+          <a:prstGeom prst="roundRect">
+            <a:avLst>
+              <a:gd name="adj" fmla="val 14039"/>
+            </a:avLst>
+          </a:prstGeom>
+          <a:noFill/>
+          <a:ln>
+            <a:solidFill>
+              <a:schemeClr val="accent2"/>
+            </a:solidFill>
+          </a:ln>
+        </p:spPr>
+        <p:style>
+          <a:lnRef idx="2">
+            <a:schemeClr val="accent1">
+              <a:shade val="50000"/>
+            </a:schemeClr>
+          </a:lnRef>
+          <a:fillRef idx="1">
+            <a:schemeClr val="accent1"/>
+          </a:fillRef>
+          <a:effectRef idx="0">
+            <a:schemeClr val="accent1"/>
+          </a:effectRef>
+          <a:fontRef idx="minor">
+            <a:schemeClr val="lt1"/>
+          </a:fontRef>
+        </p:style>
+        <p:txBody>
+          <a:bodyPr rtlCol="0" anchor="ctr"/>
+          <a:lstStyle/>
+          <a:p>
+            <a:pPr algn="ctr"/>
+            <a:endParaRPr lang="zh-TW" altLang="en-US"/>
+          </a:p>
+        </p:txBody>
+      </p:sp>
+      <p:sp>
+        <p:nvSpPr>
+          <p:cNvPr id="35" name="文字方塊 34"/>
+          <p:cNvSpPr txBox="1"/>
+          <p:nvPr/>
+        </p:nvSpPr>
+        <p:spPr>
+          <a:xfrm>
+            <a:off x="15121384" y="16076091"/>
+            <a:ext cx="4896544" cy="4154984"/>
+          </a:xfrm>
+          <a:prstGeom prst="rect">
+            <a:avLst/>
+          </a:prstGeom>
+          <a:noFill/>
+        </p:spPr>
+        <p:txBody>
+          <a:bodyPr wrap="square" rtlCol="0">
+            <a:spAutoFit/>
+          </a:bodyPr>
+          <a:lstStyle/>
+          <a:p>
+            <a:r>
+              <a:rPr lang="zh-TW" altLang="en-US" sz="4400" b="1" dirty="0" smtClean="0">
+                <a:ln w="10541" cmpd="sng">
+                  <a:solidFill>
+                    <a:schemeClr val="accent1">
+                      <a:shade val="88000"/>
+                      <a:satMod val="110000"/>
+                    </a:schemeClr>
+                  </a:solidFill>
+                  <a:prstDash val="solid"/>
+                </a:ln>
+                <a:gradFill>
+                  <a:gsLst>
+                    <a:gs pos="0">
+                      <a:schemeClr val="accent1">
+                        <a:tint val="40000"/>
+                        <a:satMod val="250000"/>
+                      </a:schemeClr>
+                    </a:gs>
+                    <a:gs pos="9000">
+                      <a:schemeClr val="accent1">
+                        <a:tint val="52000"/>
+                        <a:satMod val="300000"/>
+                      </a:schemeClr>
+                    </a:gs>
+                    <a:gs pos="50000">
+                      <a:schemeClr val="accent1">
+                        <a:shade val="20000"/>
+                        <a:satMod val="300000"/>
+                      </a:schemeClr>
+                    </a:gs>
+                    <a:gs pos="79000">
+                      <a:schemeClr val="accent1">
+                        <a:tint val="52000"/>
+                        <a:satMod val="300000"/>
+                      </a:schemeClr>
+                    </a:gs>
+                    <a:gs pos="100000">
+                      <a:schemeClr val="accent1">
+                        <a:tint val="40000"/>
+                        <a:satMod val="250000"/>
+                      </a:schemeClr>
+                    </a:gs>
+                  </a:gsLst>
+                  <a:lin ang="5400000"/>
+                </a:gradFill>
+              </a:rPr>
+              <a:t>＊</a:t>
+            </a:r>
+            <a:r>
+              <a:rPr lang="zh-TW" altLang="en-US" sz="4400" b="1" dirty="0" smtClean="0">
+                <a:ln w="10541" cmpd="sng">
+                  <a:solidFill>
+                    <a:schemeClr val="accent3">
+                      <a:lumMod val="50000"/>
+                    </a:schemeClr>
+                  </a:solidFill>
+                  <a:prstDash val="solid"/>
+                </a:ln>
+                <a:gradFill>
+                  <a:gsLst>
+                    <a:gs pos="0">
+                      <a:schemeClr val="accent3">
+                        <a:lumMod val="40000"/>
+                        <a:lumOff val="60000"/>
+                      </a:schemeClr>
+                    </a:gs>
+                    <a:gs pos="9000">
+                      <a:schemeClr val="accent3">
+                        <a:lumMod val="60000"/>
+                        <a:lumOff val="40000"/>
+                      </a:schemeClr>
+                    </a:gs>
+                    <a:gs pos="50000">
+                      <a:schemeClr val="accent3">
+                        <a:lumMod val="75000"/>
+                      </a:schemeClr>
+                    </a:gs>
+                    <a:gs pos="79000">
+                      <a:schemeClr val="accent3">
+                        <a:lumMod val="60000"/>
+                        <a:lumOff val="40000"/>
+                      </a:schemeClr>
+                    </a:gs>
+                    <a:gs pos="100000">
+                      <a:schemeClr val="accent3">
+                        <a:lumMod val="40000"/>
+                        <a:lumOff val="60000"/>
+                      </a:schemeClr>
+                    </a:gs>
+                  </a:gsLst>
+                  <a:lin ang="5400000"/>
+                </a:gradFill>
+              </a:rPr>
+              <a:t> </a:t>
+            </a:r>
+            <a:r>
+              <a:rPr lang="en-US" altLang="zh-TW" sz="4400" dirty="0" smtClean="0"/>
+              <a:t>Angry Runner </a:t>
+            </a:r>
+            <a:r>
+              <a:rPr lang="zh-TW" altLang="en-US" sz="4400" dirty="0" smtClean="0"/>
+              <a:t>會在您開始運動時自動播放音樂</a:t>
+            </a:r>
+            <a:r>
+              <a:rPr lang="zh-TW" altLang="en-US" sz="4400" dirty="0" smtClean="0"/>
+              <a:t>。</a:t>
+            </a:r>
+            <a:endParaRPr lang="en-US" altLang="zh-TW" sz="4400" dirty="0" smtClean="0"/>
+          </a:p>
+          <a:p>
+            <a:r>
+              <a:rPr lang="zh-TW" altLang="en-US" sz="4400" b="1" dirty="0" smtClean="0">
+                <a:ln w="10541" cmpd="sng">
+                  <a:solidFill>
+                    <a:schemeClr val="accent1">
+                      <a:shade val="88000"/>
+                      <a:satMod val="110000"/>
+                    </a:schemeClr>
+                  </a:solidFill>
+                  <a:prstDash val="solid"/>
+                </a:ln>
+                <a:gradFill>
+                  <a:gsLst>
+                    <a:gs pos="0">
+                      <a:schemeClr val="accent1">
+                        <a:tint val="40000"/>
+                        <a:satMod val="250000"/>
+                      </a:schemeClr>
+                    </a:gs>
+                    <a:gs pos="9000">
+                      <a:schemeClr val="accent1">
+                        <a:tint val="52000"/>
+                        <a:satMod val="300000"/>
+                      </a:schemeClr>
+                    </a:gs>
+                    <a:gs pos="50000">
+                      <a:schemeClr val="accent1">
+                        <a:shade val="20000"/>
+                        <a:satMod val="300000"/>
+                      </a:schemeClr>
+                    </a:gs>
+                    <a:gs pos="79000">
+                      <a:schemeClr val="accent1">
+                        <a:tint val="52000"/>
+                        <a:satMod val="300000"/>
+                      </a:schemeClr>
+                    </a:gs>
+                    <a:gs pos="100000">
+                      <a:schemeClr val="accent1">
+                        <a:tint val="40000"/>
+                        <a:satMod val="250000"/>
+                      </a:schemeClr>
+                    </a:gs>
+                  </a:gsLst>
+                  <a:lin ang="5400000"/>
+                </a:gradFill>
+              </a:rPr>
+              <a:t>＊</a:t>
+            </a:r>
+            <a:r>
+              <a:rPr lang="zh-TW" altLang="en-US" sz="4400" dirty="0" smtClean="0"/>
+              <a:t> </a:t>
+            </a:r>
+            <a:r>
+              <a:rPr lang="en-US" altLang="zh-TW" sz="4400" dirty="0" smtClean="0"/>
+              <a:t>Angry Runner </a:t>
+            </a:r>
+            <a:r>
+              <a:rPr lang="zh-TW" altLang="en-US" sz="4400" dirty="0" smtClean="0"/>
+              <a:t>會將您的運動路徑即時顯示在地圖上。</a:t>
+            </a:r>
+            <a:endParaRPr lang="zh-TW" altLang="en-US" sz="4400" dirty="0"/>
+          </a:p>
+        </p:txBody>
+      </p:sp>
+      <p:sp>
+        <p:nvSpPr>
+          <p:cNvPr id="36" name="圓角矩形 35"/>
+          <p:cNvSpPr/>
+          <p:nvPr/>
+        </p:nvSpPr>
+        <p:spPr>
+          <a:xfrm>
+            <a:off x="15156880" y="16148099"/>
+            <a:ext cx="4861048" cy="4104456"/>
+          </a:xfrm>
+          <a:prstGeom prst="roundRect">
+            <a:avLst>
+              <a:gd name="adj" fmla="val 6479"/>
+            </a:avLst>
+          </a:prstGeom>
+          <a:noFill/>
+          <a:ln w="38100"/>
+        </p:spPr>
+        <p:style>
+          <a:lnRef idx="2">
+            <a:schemeClr val="accent1">
+              <a:shade val="50000"/>
+            </a:schemeClr>
+          </a:lnRef>
+          <a:fillRef idx="1">
+            <a:schemeClr val="accent1"/>
+          </a:fillRef>
+          <a:effectRef idx="0">
+            <a:schemeClr val="accent1"/>
+          </a:effectRef>
+          <a:fontRef idx="minor">
+            <a:schemeClr val="lt1"/>
+          </a:fontRef>
+        </p:style>
+        <p:txBody>
+          <a:bodyPr rtlCol="0" anchor="ctr"/>
+          <a:lstStyle/>
+          <a:p>
+            <a:pPr algn="ctr"/>
+            <a:endParaRPr lang="zh-TW" altLang="en-US"/>
+          </a:p>
+        </p:txBody>
+      </p:sp>
+      <p:sp>
+        <p:nvSpPr>
+          <p:cNvPr id="37" name="文字方塊 36"/>
+          <p:cNvSpPr txBox="1"/>
+          <p:nvPr/>
+        </p:nvSpPr>
+        <p:spPr>
+          <a:xfrm>
+            <a:off x="7093000" y="10315451"/>
+            <a:ext cx="7560840" cy="2123658"/>
+          </a:xfrm>
+          <a:prstGeom prst="rect">
+            <a:avLst/>
+          </a:prstGeom>
+          <a:noFill/>
+        </p:spPr>
+        <p:txBody>
+          <a:bodyPr wrap="square" rtlCol="0">
+            <a:spAutoFit/>
+          </a:bodyPr>
+          <a:lstStyle/>
+          <a:p>
+            <a:r>
+              <a:rPr lang="zh-TW" altLang="en-US" sz="4400" b="1" dirty="0" smtClean="0">
+                <a:ln w="10541" cmpd="sng">
+                  <a:solidFill>
+                    <a:schemeClr val="accent3">
+                      <a:lumMod val="50000"/>
+                    </a:schemeClr>
+                  </a:solidFill>
+                  <a:prstDash val="solid"/>
+                </a:ln>
+                <a:gradFill>
+                  <a:gsLst>
+                    <a:gs pos="0">
+                      <a:schemeClr val="accent3">
+                        <a:lumMod val="40000"/>
+                        <a:lumOff val="60000"/>
+                      </a:schemeClr>
+                    </a:gs>
+                    <a:gs pos="9000">
+                      <a:schemeClr val="accent3">
+                        <a:lumMod val="60000"/>
+                        <a:lumOff val="40000"/>
+                      </a:schemeClr>
+                    </a:gs>
+                    <a:gs pos="50000">
+                      <a:schemeClr val="accent3">
+                        <a:lumMod val="75000"/>
+                      </a:schemeClr>
+                    </a:gs>
+                    <a:gs pos="79000">
+                      <a:schemeClr val="accent3">
+                        <a:lumMod val="60000"/>
+                        <a:lumOff val="40000"/>
+                      </a:schemeClr>
+                    </a:gs>
+                    <a:gs pos="100000">
+                      <a:schemeClr val="accent3">
+                        <a:lumMod val="40000"/>
+                        <a:lumOff val="60000"/>
+                      </a:schemeClr>
+                    </a:gs>
+                  </a:gsLst>
+                  <a:lin ang="5400000"/>
+                </a:gradFill>
+              </a:rPr>
+              <a:t>＊</a:t>
+            </a:r>
+            <a:r>
+              <a:rPr lang="zh-TW" altLang="en-US" sz="4400" dirty="0" smtClean="0"/>
+              <a:t>您可以在 </a:t>
+            </a:r>
+            <a:r>
+              <a:rPr lang="en-US" altLang="zh-TW" sz="4400" dirty="0" smtClean="0"/>
+              <a:t>Angry Runner </a:t>
+            </a:r>
+            <a:r>
+              <a:rPr lang="zh-TW" altLang="en-US" sz="4400" dirty="0" smtClean="0"/>
+              <a:t>指定運動時播放的音樂清單，或建立新的音樂清單</a:t>
+            </a:r>
+            <a:r>
+              <a:rPr lang="zh-TW" altLang="en-US" sz="4400" dirty="0" smtClean="0"/>
+              <a:t>。</a:t>
+            </a:r>
+            <a:endParaRPr lang="en-US" altLang="zh-TW" sz="4400" dirty="0" smtClean="0"/>
+          </a:p>
+        </p:txBody>
+      </p:sp>
+      <p:sp>
+        <p:nvSpPr>
+          <p:cNvPr id="38" name="圓角矩形 37"/>
+          <p:cNvSpPr/>
+          <p:nvPr/>
+        </p:nvSpPr>
+        <p:spPr>
+          <a:xfrm>
+            <a:off x="7093000" y="10315451"/>
+            <a:ext cx="7560840" cy="2160240"/>
+          </a:xfrm>
+          <a:prstGeom prst="roundRect">
+            <a:avLst>
+              <a:gd name="adj" fmla="val 13325"/>
+            </a:avLst>
+          </a:prstGeom>
+          <a:noFill/>
+          <a:ln w="38100"/>
+        </p:spPr>
+        <p:style>
+          <a:lnRef idx="2">
+            <a:schemeClr val="accent3"/>
+          </a:lnRef>
+          <a:fillRef idx="1">
+            <a:schemeClr val="lt1"/>
+          </a:fillRef>
+          <a:effectRef idx="0">
+            <a:schemeClr val="accent3"/>
+          </a:effectRef>
+          <a:fontRef idx="minor">
+            <a:schemeClr val="dk1"/>
+          </a:fontRef>
+        </p:style>
+        <p:txBody>
+          <a:bodyPr rtlCol="0" anchor="ctr"/>
+          <a:lstStyle/>
+          <a:p>
+            <a:pPr algn="ctr"/>
+            <a:endParaRPr lang="zh-TW" altLang="en-US"/>
+          </a:p>
+        </p:txBody>
+      </p:sp>
+      <p:sp>
+        <p:nvSpPr>
+          <p:cNvPr id="39" name="文字方塊 38"/>
+          <p:cNvSpPr txBox="1"/>
+          <p:nvPr/>
+        </p:nvSpPr>
+        <p:spPr>
+          <a:xfrm>
+            <a:off x="1260352" y="19604483"/>
+            <a:ext cx="6347263" cy="2123658"/>
+          </a:xfrm>
+          <a:prstGeom prst="rect">
+            <a:avLst/>
+          </a:prstGeom>
+          <a:noFill/>
+        </p:spPr>
+        <p:txBody>
+          <a:bodyPr wrap="square" rtlCol="0">
+            <a:spAutoFit/>
+          </a:bodyPr>
+          <a:lstStyle/>
+          <a:p>
+            <a:r>
+              <a:rPr lang="zh-TW" altLang="en-US" sz="4400" b="1" dirty="0" smtClean="0">
+                <a:ln w="10541" cmpd="sng">
+                  <a:solidFill>
+                    <a:schemeClr val="accent4">
+                      <a:lumMod val="50000"/>
+                    </a:schemeClr>
+                  </a:solidFill>
+                  <a:prstDash val="solid"/>
+                </a:ln>
+                <a:gradFill>
+                  <a:gsLst>
+                    <a:gs pos="0">
+                      <a:schemeClr val="accent4">
+                        <a:lumMod val="40000"/>
+                        <a:lumOff val="60000"/>
+                      </a:schemeClr>
+                    </a:gs>
+                    <a:gs pos="9000">
+                      <a:schemeClr val="accent4">
+                        <a:lumMod val="60000"/>
+                        <a:lumOff val="40000"/>
+                      </a:schemeClr>
+                    </a:gs>
+                    <a:gs pos="50000">
+                      <a:schemeClr val="accent4">
+                        <a:lumMod val="75000"/>
+                      </a:schemeClr>
+                    </a:gs>
+                    <a:gs pos="79000">
+                      <a:schemeClr val="accent4">
+                        <a:lumMod val="60000"/>
+                        <a:lumOff val="40000"/>
+                      </a:schemeClr>
+                    </a:gs>
+                    <a:gs pos="100000">
+                      <a:schemeClr val="accent4">
+                        <a:lumMod val="40000"/>
+                        <a:lumOff val="60000"/>
+                      </a:schemeClr>
+                    </a:gs>
+                  </a:gsLst>
+                  <a:lin ang="5400000"/>
+                </a:gradFill>
+              </a:rPr>
+              <a:t>＊</a:t>
+            </a:r>
+            <a:r>
+              <a:rPr lang="zh-TW" altLang="en-US" sz="4400" dirty="0" smtClean="0"/>
+              <a:t> </a:t>
+            </a:r>
+            <a:r>
+              <a:rPr lang="en-US" altLang="zh-TW" sz="4400" dirty="0" smtClean="0"/>
+              <a:t>Angry Runner </a:t>
+            </a:r>
+            <a:r>
+              <a:rPr lang="zh-TW" altLang="en-US" sz="4400" dirty="0" smtClean="0"/>
+              <a:t>可以保存您的運動記錄，包括日期、運動時間、距離及速度。</a:t>
+            </a:r>
+            <a:endParaRPr lang="zh-TW" altLang="en-US" sz="4400" dirty="0"/>
+          </a:p>
+        </p:txBody>
+      </p:sp>
+      <p:sp>
+        <p:nvSpPr>
+          <p:cNvPr id="40" name="圓角矩形 39"/>
+          <p:cNvSpPr/>
+          <p:nvPr/>
+        </p:nvSpPr>
+        <p:spPr>
+          <a:xfrm>
+            <a:off x="1260352" y="19676491"/>
+            <a:ext cx="6912768" cy="2016224"/>
+          </a:xfrm>
+          <a:prstGeom prst="roundRect">
+            <a:avLst>
+              <a:gd name="adj" fmla="val 13087"/>
+            </a:avLst>
+          </a:prstGeom>
+          <a:noFill/>
+          <a:ln w="38100"/>
+        </p:spPr>
+        <p:style>
+          <a:lnRef idx="2">
+            <a:schemeClr val="accent4"/>
+          </a:lnRef>
+          <a:fillRef idx="1">
+            <a:schemeClr val="lt1"/>
+          </a:fillRef>
+          <a:effectRef idx="0">
+            <a:schemeClr val="accent4"/>
+          </a:effectRef>
+          <a:fontRef idx="minor">
+            <a:schemeClr val="dk1"/>
+          </a:fontRef>
+        </p:style>
+        <p:txBody>
+          <a:bodyPr rtlCol="0" anchor="ctr"/>
+          <a:lstStyle/>
+          <a:p>
+            <a:pPr algn="ctr"/>
+            <a:endParaRPr lang="zh-TW" altLang="en-US"/>
+          </a:p>
+        </p:txBody>
+      </p:sp>
     </p:spTree>
   </p:cSld>
   <p:clrMapOvr>

</xml_diff>

<commit_message>
Add border for poster v2.5
</commit_message>
<xml_diff>
--- a/poster.pptx
+++ b/poster.pptx
@@ -192,7 +192,8 @@
           <a:p>
             <a:fld id="{A935A430-2E5E-4C15-B9AD-3105F4E47E17}" type="datetimeFigureOut">
               <a:rPr lang="zh-TW" altLang="en-US" smtClean="0"/>
-              <a:t>2011/12/25</a:t>
+              <a:pPr/>
+              <a:t>2011/12/26</a:t>
             </a:fld>
             <a:endParaRPr lang="zh-TW" altLang="en-US"/>
           </a:p>
@@ -353,6 +354,7 @@
           <a:p>
             <a:fld id="{4E05F29E-FC43-48B6-B3D8-FE3780C8300C}" type="slidenum">
               <a:rPr lang="zh-TW" altLang="en-US" smtClean="0"/>
+              <a:pPr/>
               <a:t>‹#›</a:t>
             </a:fld>
             <a:endParaRPr lang="zh-TW" altLang="en-US"/>
@@ -524,6 +526,7 @@
           <a:p>
             <a:fld id="{4E05F29E-FC43-48B6-B3D8-FE3780C8300C}" type="slidenum">
               <a:rPr lang="zh-TW" altLang="en-US" smtClean="0"/>
+              <a:pPr/>
               <a:t>1</a:t>
             </a:fld>
             <a:endParaRPr lang="zh-TW" altLang="en-US"/>
@@ -720,7 +723,7 @@
             <a:fld id="{6824B76D-F948-4EDF-B5E4-A06A15984D1A}" type="datetimeFigureOut">
               <a:rPr lang="zh-TW" altLang="en-US" smtClean="0"/>
               <a:pPr/>
-              <a:t>2011/12/25</a:t>
+              <a:t>2011/12/26</a:t>
             </a:fld>
             <a:endParaRPr lang="zh-TW" altLang="en-US"/>
           </a:p>
@@ -887,7 +890,7 @@
             <a:fld id="{6824B76D-F948-4EDF-B5E4-A06A15984D1A}" type="datetimeFigureOut">
               <a:rPr lang="zh-TW" altLang="en-US" smtClean="0"/>
               <a:pPr/>
-              <a:t>2011/12/25</a:t>
+              <a:t>2011/12/26</a:t>
             </a:fld>
             <a:endParaRPr lang="zh-TW" altLang="en-US"/>
           </a:p>
@@ -1064,7 +1067,7 @@
             <a:fld id="{6824B76D-F948-4EDF-B5E4-A06A15984D1A}" type="datetimeFigureOut">
               <a:rPr lang="zh-TW" altLang="en-US" smtClean="0"/>
               <a:pPr/>
-              <a:t>2011/12/25</a:t>
+              <a:t>2011/12/26</a:t>
             </a:fld>
             <a:endParaRPr lang="zh-TW" altLang="en-US"/>
           </a:p>
@@ -1231,7 +1234,7 @@
             <a:fld id="{6824B76D-F948-4EDF-B5E4-A06A15984D1A}" type="datetimeFigureOut">
               <a:rPr lang="zh-TW" altLang="en-US" smtClean="0"/>
               <a:pPr/>
-              <a:t>2011/12/25</a:t>
+              <a:t>2011/12/26</a:t>
             </a:fld>
             <a:endParaRPr lang="zh-TW" altLang="en-US"/>
           </a:p>
@@ -1474,7 +1477,7 @@
             <a:fld id="{6824B76D-F948-4EDF-B5E4-A06A15984D1A}" type="datetimeFigureOut">
               <a:rPr lang="zh-TW" altLang="en-US" smtClean="0"/>
               <a:pPr/>
-              <a:t>2011/12/25</a:t>
+              <a:t>2011/12/26</a:t>
             </a:fld>
             <a:endParaRPr lang="zh-TW" altLang="en-US"/>
           </a:p>
@@ -1759,7 +1762,7 @@
             <a:fld id="{6824B76D-F948-4EDF-B5E4-A06A15984D1A}" type="datetimeFigureOut">
               <a:rPr lang="zh-TW" altLang="en-US" smtClean="0"/>
               <a:pPr/>
-              <a:t>2011/12/25</a:t>
+              <a:t>2011/12/26</a:t>
             </a:fld>
             <a:endParaRPr lang="zh-TW" altLang="en-US"/>
           </a:p>
@@ -2183,7 +2186,7 @@
             <a:fld id="{6824B76D-F948-4EDF-B5E4-A06A15984D1A}" type="datetimeFigureOut">
               <a:rPr lang="zh-TW" altLang="en-US" smtClean="0"/>
               <a:pPr/>
-              <a:t>2011/12/25</a:t>
+              <a:t>2011/12/26</a:t>
             </a:fld>
             <a:endParaRPr lang="zh-TW" altLang="en-US"/>
           </a:p>
@@ -2298,7 +2301,7 @@
             <a:fld id="{6824B76D-F948-4EDF-B5E4-A06A15984D1A}" type="datetimeFigureOut">
               <a:rPr lang="zh-TW" altLang="en-US" smtClean="0"/>
               <a:pPr/>
-              <a:t>2011/12/25</a:t>
+              <a:t>2011/12/26</a:t>
             </a:fld>
             <a:endParaRPr lang="zh-TW" altLang="en-US"/>
           </a:p>
@@ -2390,7 +2393,7 @@
             <a:fld id="{6824B76D-F948-4EDF-B5E4-A06A15984D1A}" type="datetimeFigureOut">
               <a:rPr lang="zh-TW" altLang="en-US" smtClean="0"/>
               <a:pPr/>
-              <a:t>2011/12/25</a:t>
+              <a:t>2011/12/26</a:t>
             </a:fld>
             <a:endParaRPr lang="zh-TW" altLang="en-US"/>
           </a:p>
@@ -2664,7 +2667,7 @@
             <a:fld id="{6824B76D-F948-4EDF-B5E4-A06A15984D1A}" type="datetimeFigureOut">
               <a:rPr lang="zh-TW" altLang="en-US" smtClean="0"/>
               <a:pPr/>
-              <a:t>2011/12/25</a:t>
+              <a:t>2011/12/26</a:t>
             </a:fld>
             <a:endParaRPr lang="zh-TW" altLang="en-US"/>
           </a:p>
@@ -2914,7 +2917,7 @@
             <a:fld id="{6824B76D-F948-4EDF-B5E4-A06A15984D1A}" type="datetimeFigureOut">
               <a:rPr lang="zh-TW" altLang="en-US" smtClean="0"/>
               <a:pPr/>
-              <a:t>2011/12/25</a:t>
+              <a:t>2011/12/26</a:t>
             </a:fld>
             <a:endParaRPr lang="zh-TW" altLang="en-US"/>
           </a:p>
@@ -3124,7 +3127,7 @@
             <a:fld id="{6824B76D-F948-4EDF-B5E4-A06A15984D1A}" type="datetimeFigureOut">
               <a:rPr lang="zh-TW" altLang="en-US" smtClean="0"/>
               <a:pPr/>
-              <a:t>2011/12/25</a:t>
+              <a:t>2011/12/26</a:t>
             </a:fld>
             <a:endParaRPr lang="zh-TW" altLang="en-US"/>
           </a:p>
@@ -3495,6 +3498,380 @@
           <a:chExt cx="0" cy="0"/>
         </a:xfrm>
       </p:grpSpPr>
+      <p:grpSp>
+        <p:nvGrpSpPr>
+          <p:cNvPr id="54" name="群組 53"/>
+          <p:cNvGrpSpPr/>
+          <p:nvPr/>
+        </p:nvGrpSpPr>
+        <p:grpSpPr>
+          <a:xfrm>
+            <a:off x="1260352" y="13123763"/>
+            <a:ext cx="13249472" cy="8568952"/>
+            <a:chOff x="1260352" y="13123763"/>
+            <a:chExt cx="13249472" cy="8568952"/>
+          </a:xfrm>
+        </p:grpSpPr>
+        <p:sp>
+          <p:nvSpPr>
+            <p:cNvPr id="40" name="圓角矩形 39"/>
+            <p:cNvSpPr/>
+            <p:nvPr/>
+          </p:nvSpPr>
+          <p:spPr>
+            <a:xfrm>
+              <a:off x="1260352" y="19244443"/>
+              <a:ext cx="8640960" cy="2448272"/>
+            </a:xfrm>
+            <a:prstGeom prst="roundRect">
+              <a:avLst>
+                <a:gd name="adj" fmla="val 18001"/>
+              </a:avLst>
+            </a:prstGeom>
+            <a:noFill/>
+            <a:ln w="38100"/>
+          </p:spPr>
+          <p:style>
+            <a:lnRef idx="2">
+              <a:schemeClr val="accent4"/>
+            </a:lnRef>
+            <a:fillRef idx="1">
+              <a:schemeClr val="lt1"/>
+            </a:fillRef>
+            <a:effectRef idx="0">
+              <a:schemeClr val="accent4"/>
+            </a:effectRef>
+            <a:fontRef idx="minor">
+              <a:schemeClr val="dk1"/>
+            </a:fontRef>
+          </p:style>
+          <p:txBody>
+            <a:bodyPr rtlCol="0" anchor="ctr"/>
+            <a:lstStyle/>
+            <a:p>
+              <a:pPr algn="ctr"/>
+              <a:endParaRPr lang="zh-TW" altLang="en-US"/>
+            </a:p>
+          </p:txBody>
+        </p:sp>
+        <p:sp>
+          <p:nvSpPr>
+            <p:cNvPr id="51" name="圓角矩形 50"/>
+            <p:cNvSpPr/>
+            <p:nvPr/>
+          </p:nvSpPr>
+          <p:spPr>
+            <a:xfrm>
+              <a:off x="8821192" y="13123763"/>
+              <a:ext cx="5688632" cy="8568952"/>
+            </a:xfrm>
+            <a:prstGeom prst="roundRect">
+              <a:avLst>
+                <a:gd name="adj" fmla="val 7588"/>
+              </a:avLst>
+            </a:prstGeom>
+            <a:noFill/>
+            <a:ln w="38100"/>
+          </p:spPr>
+          <p:style>
+            <a:lnRef idx="2">
+              <a:schemeClr val="accent4"/>
+            </a:lnRef>
+            <a:fillRef idx="1">
+              <a:schemeClr val="lt1"/>
+            </a:fillRef>
+            <a:effectRef idx="0">
+              <a:schemeClr val="accent4"/>
+            </a:effectRef>
+            <a:fontRef idx="minor">
+              <a:schemeClr val="dk1"/>
+            </a:fontRef>
+          </p:style>
+          <p:txBody>
+            <a:bodyPr rtlCol="0" anchor="ctr"/>
+            <a:lstStyle/>
+            <a:p>
+              <a:pPr algn="ctr"/>
+              <a:endParaRPr lang="zh-TW" altLang="en-US"/>
+            </a:p>
+          </p:txBody>
+        </p:sp>
+        <p:sp>
+          <p:nvSpPr>
+            <p:cNvPr id="53" name="矩形 52"/>
+            <p:cNvSpPr/>
+            <p:nvPr/>
+          </p:nvSpPr>
+          <p:spPr>
+            <a:xfrm>
+              <a:off x="8361961" y="18794465"/>
+              <a:ext cx="2016224" cy="2880320"/>
+            </a:xfrm>
+            <a:prstGeom prst="rect">
+              <a:avLst/>
+            </a:prstGeom>
+            <a:solidFill>
+              <a:schemeClr val="bg1"/>
+            </a:solidFill>
+            <a:ln>
+              <a:noFill/>
+            </a:ln>
+          </p:spPr>
+          <p:style>
+            <a:lnRef idx="2">
+              <a:schemeClr val="accent1">
+                <a:shade val="50000"/>
+              </a:schemeClr>
+            </a:lnRef>
+            <a:fillRef idx="1">
+              <a:schemeClr val="accent1"/>
+            </a:fillRef>
+            <a:effectRef idx="0">
+              <a:schemeClr val="accent1"/>
+            </a:effectRef>
+            <a:fontRef idx="minor">
+              <a:schemeClr val="lt1"/>
+            </a:fontRef>
+          </p:style>
+          <p:txBody>
+            <a:bodyPr rtlCol="0" anchor="ctr"/>
+            <a:lstStyle/>
+            <a:p>
+              <a:pPr algn="ctr"/>
+              <a:endParaRPr lang="en-US"/>
+            </a:p>
+          </p:txBody>
+        </p:sp>
+        <p:sp>
+          <p:nvSpPr>
+            <p:cNvPr id="52" name="弧形 51"/>
+            <p:cNvSpPr/>
+            <p:nvPr/>
+          </p:nvSpPr>
+          <p:spPr>
+            <a:xfrm flipV="1">
+              <a:off x="7885088" y="18308339"/>
+              <a:ext cx="936000" cy="936000"/>
+            </a:xfrm>
+            <a:prstGeom prst="arc">
+              <a:avLst/>
+            </a:prstGeom>
+            <a:ln w="38100">
+              <a:solidFill>
+                <a:schemeClr val="accent4"/>
+              </a:solidFill>
+            </a:ln>
+          </p:spPr>
+          <p:style>
+            <a:lnRef idx="1">
+              <a:schemeClr val="accent1"/>
+            </a:lnRef>
+            <a:fillRef idx="0">
+              <a:schemeClr val="accent1"/>
+            </a:fillRef>
+            <a:effectRef idx="0">
+              <a:schemeClr val="accent1"/>
+            </a:effectRef>
+            <a:fontRef idx="minor">
+              <a:schemeClr val="tx1"/>
+            </a:fontRef>
+          </p:style>
+          <p:txBody>
+            <a:bodyPr rtlCol="0" anchor="ctr"/>
+            <a:lstStyle/>
+            <a:p>
+              <a:pPr algn="ctr"/>
+              <a:endParaRPr lang="en-US"/>
+            </a:p>
+          </p:txBody>
+        </p:sp>
+      </p:grpSp>
+      <p:grpSp>
+        <p:nvGrpSpPr>
+          <p:cNvPr id="50" name="群組 49"/>
+          <p:cNvGrpSpPr/>
+          <p:nvPr/>
+        </p:nvGrpSpPr>
+        <p:grpSpPr>
+          <a:xfrm>
+            <a:off x="1260352" y="10243443"/>
+            <a:ext cx="13249472" cy="8712968"/>
+            <a:chOff x="1260352" y="10243443"/>
+            <a:chExt cx="13249472" cy="8712968"/>
+          </a:xfrm>
+        </p:grpSpPr>
+        <p:sp>
+          <p:nvSpPr>
+            <p:cNvPr id="38" name="圓角矩形 37"/>
+            <p:cNvSpPr/>
+            <p:nvPr/>
+          </p:nvSpPr>
+          <p:spPr>
+            <a:xfrm>
+              <a:off x="4788744" y="10243443"/>
+              <a:ext cx="9721080" cy="2448272"/>
+            </a:xfrm>
+            <a:prstGeom prst="roundRect">
+              <a:avLst>
+                <a:gd name="adj" fmla="val 13325"/>
+              </a:avLst>
+            </a:prstGeom>
+            <a:noFill/>
+            <a:ln w="38100"/>
+          </p:spPr>
+          <p:style>
+            <a:lnRef idx="2">
+              <a:schemeClr val="accent3"/>
+            </a:lnRef>
+            <a:fillRef idx="1">
+              <a:schemeClr val="lt1"/>
+            </a:fillRef>
+            <a:effectRef idx="0">
+              <a:schemeClr val="accent3"/>
+            </a:effectRef>
+            <a:fontRef idx="minor">
+              <a:schemeClr val="dk1"/>
+            </a:fontRef>
+          </p:style>
+          <p:txBody>
+            <a:bodyPr rtlCol="0" anchor="ctr"/>
+            <a:lstStyle/>
+            <a:p>
+              <a:pPr algn="ctr"/>
+              <a:endParaRPr lang="zh-TW" altLang="en-US"/>
+            </a:p>
+          </p:txBody>
+        </p:sp>
+        <p:sp>
+          <p:nvSpPr>
+            <p:cNvPr id="45" name="圓角矩形 44"/>
+            <p:cNvSpPr/>
+            <p:nvPr/>
+          </p:nvSpPr>
+          <p:spPr>
+            <a:xfrm>
+              <a:off x="1260352" y="10243443"/>
+              <a:ext cx="5400600" cy="8712968"/>
+            </a:xfrm>
+            <a:prstGeom prst="roundRect">
+              <a:avLst>
+                <a:gd name="adj" fmla="val 10545"/>
+              </a:avLst>
+            </a:prstGeom>
+            <a:noFill/>
+            <a:ln w="38100"/>
+          </p:spPr>
+          <p:style>
+            <a:lnRef idx="2">
+              <a:schemeClr val="accent3"/>
+            </a:lnRef>
+            <a:fillRef idx="1">
+              <a:schemeClr val="lt1"/>
+            </a:fillRef>
+            <a:effectRef idx="0">
+              <a:schemeClr val="accent3"/>
+            </a:effectRef>
+            <a:fontRef idx="minor">
+              <a:schemeClr val="dk1"/>
+            </a:fontRef>
+          </p:style>
+          <p:txBody>
+            <a:bodyPr rtlCol="0" anchor="ctr"/>
+            <a:lstStyle/>
+            <a:p>
+              <a:pPr algn="ctr"/>
+              <a:endParaRPr lang="zh-TW" altLang="en-US"/>
+            </a:p>
+          </p:txBody>
+        </p:sp>
+        <p:sp>
+          <p:nvSpPr>
+            <p:cNvPr id="46" name="矩形 45"/>
+            <p:cNvSpPr/>
+            <p:nvPr/>
+          </p:nvSpPr>
+          <p:spPr>
+            <a:xfrm>
+              <a:off x="4500712" y="10255457"/>
+              <a:ext cx="2592288" cy="2921264"/>
+            </a:xfrm>
+            <a:prstGeom prst="rect">
+              <a:avLst/>
+            </a:prstGeom>
+            <a:ln>
+              <a:noFill/>
+            </a:ln>
+          </p:spPr>
+          <p:style>
+            <a:lnRef idx="2">
+              <a:schemeClr val="accent6"/>
+            </a:lnRef>
+            <a:fillRef idx="1">
+              <a:schemeClr val="lt1"/>
+            </a:fillRef>
+            <a:effectRef idx="0">
+              <a:schemeClr val="accent6"/>
+            </a:effectRef>
+            <a:fontRef idx="minor">
+              <a:schemeClr val="dk1"/>
+            </a:fontRef>
+          </p:style>
+          <p:txBody>
+            <a:bodyPr rtlCol="0" anchor="ctr"/>
+            <a:lstStyle/>
+            <a:p>
+              <a:pPr algn="ctr"/>
+              <a:endParaRPr lang="en-US"/>
+            </a:p>
+          </p:txBody>
+        </p:sp>
+        <p:sp>
+          <p:nvSpPr>
+            <p:cNvPr id="47" name="弧形 46"/>
+            <p:cNvSpPr/>
+            <p:nvPr/>
+          </p:nvSpPr>
+          <p:spPr>
+            <a:xfrm>
+              <a:off x="6660952" y="12691715"/>
+              <a:ext cx="972000" cy="972000"/>
+            </a:xfrm>
+            <a:prstGeom prst="arc">
+              <a:avLst>
+                <a:gd name="adj1" fmla="val 10636279"/>
+                <a:gd name="adj2" fmla="val 16262060"/>
+              </a:avLst>
+            </a:prstGeom>
+            <a:ln w="38100">
+              <a:solidFill>
+                <a:schemeClr val="accent3"/>
+              </a:solidFill>
+            </a:ln>
+          </p:spPr>
+          <p:style>
+            <a:lnRef idx="1">
+              <a:schemeClr val="accent1"/>
+            </a:lnRef>
+            <a:fillRef idx="0">
+              <a:schemeClr val="accent1"/>
+            </a:fillRef>
+            <a:effectRef idx="0">
+              <a:schemeClr val="accent1"/>
+            </a:effectRef>
+            <a:fontRef idx="minor">
+              <a:schemeClr val="tx1"/>
+            </a:fontRef>
+          </p:style>
+          <p:txBody>
+            <a:bodyPr rtlCol="0" anchor="ctr"/>
+            <a:lstStyle/>
+            <a:p>
+              <a:pPr algn="ctr"/>
+              <a:endParaRPr lang="en-US"/>
+            </a:p>
+          </p:txBody>
+        </p:sp>
+      </p:grpSp>
       <p:sp>
         <p:nvSpPr>
           <p:cNvPr id="2" name="標題 1"/>
@@ -3562,52 +3939,7 @@
                 </a:effectLst>
                 <a:latin typeface="Jokerman" pitchFamily="82" charset="0"/>
               </a:rPr>
-              <a:t>Angry </a:t>
-            </a:r>
-            <a:r>
-              <a:rPr lang="en-US" altLang="zh-TW" dirty="0" smtClean="0">
-                <a:ln>
-                  <a:solidFill>
-                    <a:srgbClr val="7030A0"/>
-                  </a:solidFill>
-                </a:ln>
-                <a:gradFill flip="none" rotWithShape="1">
-                  <a:gsLst>
-                    <a:gs pos="0">
-                      <a:srgbClr val="3399FF"/>
-                    </a:gs>
-                    <a:gs pos="16000">
-                      <a:srgbClr val="00CCCC"/>
-                    </a:gs>
-                    <a:gs pos="47000">
-                      <a:srgbClr val="9999FF"/>
-                    </a:gs>
-                    <a:gs pos="60001">
-                      <a:srgbClr val="2E6792"/>
-                    </a:gs>
-                    <a:gs pos="71001">
-                      <a:srgbClr val="3333CC"/>
-                    </a:gs>
-                    <a:gs pos="81000">
-                      <a:srgbClr val="1170FF"/>
-                    </a:gs>
-                    <a:gs pos="100000">
-                      <a:srgbClr val="006699"/>
-                    </a:gs>
-                  </a:gsLst>
-                  <a:lin ang="10800000" scaled="0"/>
-                  <a:tileRect/>
-                </a:gradFill>
-                <a:effectLst>
-                  <a:outerShdw blurRad="60007" dist="200025" dir="15000000" sy="30000" kx="-1800000" algn="bl" rotWithShape="0">
-                    <a:prstClr val="black">
-                      <a:alpha val="32000"/>
-                    </a:prstClr>
-                  </a:outerShdw>
-                </a:effectLst>
-                <a:latin typeface="Jokerman" pitchFamily="82" charset="0"/>
-              </a:rPr>
-              <a:t>     Runner</a:t>
+              <a:t>Angry      Runner</a:t>
             </a:r>
             <a:endParaRPr lang="zh-TW" altLang="en-US" dirty="0">
               <a:ln>
@@ -3751,11 +4083,7 @@
             </a:r>
             <a:r>
               <a:rPr lang="zh-TW" altLang="en-US" sz="4800" dirty="0" smtClean="0"/>
-              <a:t>   </a:t>
-            </a:r>
-            <a:r>
-              <a:rPr lang="zh-TW" altLang="en-US" sz="4800" dirty="0" smtClean="0"/>
-              <a:t>組員</a:t>
+              <a:t>   組員</a:t>
             </a:r>
             <a:r>
               <a:rPr lang="en-US" altLang="zh-TW" sz="4800" dirty="0" smtClean="0"/>
@@ -3770,15 +4098,7 @@
             </a:r>
             <a:r>
               <a:rPr lang="zh-TW" altLang="en-US" sz="4800" dirty="0" smtClean="0"/>
-              <a:t>   </a:t>
-            </a:r>
-            <a:r>
-              <a:rPr lang="zh-TW" altLang="en-US" sz="4800" dirty="0" smtClean="0"/>
-              <a:t>指導</a:t>
-            </a:r>
-            <a:r>
-              <a:rPr lang="zh-TW" altLang="en-US" sz="4800" dirty="0" smtClean="0"/>
-              <a:t>老師</a:t>
+              <a:t>   指導老師</a:t>
             </a:r>
             <a:r>
               <a:rPr lang="en-US" altLang="zh-TW" sz="4800" dirty="0" smtClean="0"/>
@@ -3789,14 +4109,7 @@
                 <a:latin typeface="標楷體" pitchFamily="65" charset="-120"/>
                 <a:ea typeface="標楷體" pitchFamily="65" charset="-120"/>
               </a:rPr>
-              <a:t>陳彥</a:t>
-            </a:r>
-            <a:r>
-              <a:rPr lang="zh-TW" altLang="en-US" sz="4800" dirty="0" smtClean="0">
-                <a:latin typeface="標楷體" pitchFamily="65" charset="-120"/>
-                <a:ea typeface="標楷體" pitchFamily="65" charset="-120"/>
-              </a:rPr>
-              <a:t>仰教授</a:t>
+              <a:t>陳彥仰教授</a:t>
             </a:r>
             <a:endParaRPr lang="zh-TW" altLang="en-US" sz="4800" dirty="0">
               <a:latin typeface="標楷體" pitchFamily="65" charset="-120"/>
@@ -4015,23 +4328,7 @@
           <a:p>
             <a:r>
               <a:rPr lang="zh-TW" altLang="en-US" sz="4800" dirty="0" smtClean="0"/>
-              <a:t>音樂讓你的運動時間更有趣</a:t>
-            </a:r>
-            <a:r>
-              <a:rPr lang="zh-TW" altLang="en-US" sz="4800" dirty="0" smtClean="0"/>
-              <a:t>，利用</a:t>
-            </a:r>
-            <a:r>
-              <a:rPr lang="zh-TW" altLang="en-US" sz="4800" dirty="0" smtClean="0"/>
-              <a:t>你喜愛的音樂幫助你運動時維持在最佳速度</a:t>
-            </a:r>
-            <a:r>
-              <a:rPr lang="zh-TW" altLang="en-US" sz="4800" dirty="0" smtClean="0"/>
-              <a:t>，讓</a:t>
-            </a:r>
-            <a:r>
-              <a:rPr lang="zh-TW" altLang="en-US" sz="4800" dirty="0" smtClean="0"/>
-              <a:t>你在有限的運動時間內能燃燒最多卡路里。</a:t>
+              <a:t>音樂讓你的運動時間更有趣，利用你喜愛的音樂幫助你運動時維持在最佳速度，讓你在有限的運動時間內能燃燒最多卡路里。</a:t>
             </a:r>
             <a:endParaRPr lang="zh-TW" altLang="en-US" sz="4800" dirty="0"/>
           </a:p>
@@ -4063,7 +4360,7 @@
       </p:pic>
       <p:pic>
         <p:nvPicPr>
-          <p:cNvPr id="17" name="Picture 4" descr="C:\Documents and Settings\user\桌面\MobileProgramming\project\screenshot\device-2011-12-22-145919_gmap.png"/>
+          <p:cNvPr id="20" name="Picture 4" descr="C:\Documents and Settings\user\桌面\MobileProgramming\project\screenshot\device-2011-12-22-145919_gmap.png"/>
           <p:cNvPicPr>
             <a:picLocks noChangeAspect="1" noChangeArrowheads="1"/>
           </p:cNvPicPr>
@@ -4077,40 +4374,7 @@
         </p:blipFill>
         <p:spPr bwMode="auto">
           <a:xfrm>
-            <a:off x="15445928" y="7003083"/>
-            <a:ext cx="4572000" cy="7620000"/>
-          </a:xfrm>
-          <a:prstGeom prst="rect">
-            <a:avLst/>
-          </a:prstGeom>
-          <a:noFill/>
-          <a:ln w="38100">
-            <a:solidFill>
-              <a:schemeClr val="accent2">
-                <a:lumMod val="60000"/>
-                <a:lumOff val="40000"/>
-              </a:schemeClr>
-            </a:solidFill>
-          </a:ln>
-        </p:spPr>
-      </p:pic>
-      <p:pic>
-        <p:nvPicPr>
-          <p:cNvPr id="20" name="Picture 4" descr="C:\Documents and Settings\user\桌面\MobileProgramming\project\screenshot\device-2011-12-22-145919_gmap.png"/>
-          <p:cNvPicPr>
-            <a:picLocks noChangeAspect="1" noChangeArrowheads="1"/>
-          </p:cNvPicPr>
-          <p:nvPr/>
-        </p:nvPicPr>
-        <p:blipFill>
-          <a:blip r:embed="rId5" cstate="print"/>
-          <a:stretch>
-            <a:fillRect/>
-          </a:stretch>
-        </p:blipFill>
-        <p:spPr bwMode="auto">
-          <a:xfrm>
-            <a:off x="9325248" y="14072715"/>
+            <a:off x="9505776" y="13627819"/>
             <a:ext cx="4572000" cy="7620000"/>
           </a:xfrm>
           <a:prstGeom prst="rect">
@@ -4136,14 +4400,14 @@
           <p:nvPr/>
         </p:nvPicPr>
         <p:blipFill>
-          <a:blip r:embed="rId6" cstate="print"/>
+          <a:blip r:embed="rId5" cstate="print"/>
           <a:stretch>
             <a:fillRect/>
           </a:stretch>
         </p:blipFill>
         <p:spPr bwMode="auto">
           <a:xfrm>
-            <a:off x="1260352" y="10315451"/>
+            <a:off x="1656904" y="10832355"/>
             <a:ext cx="4572000" cy="7620000"/>
           </a:xfrm>
           <a:prstGeom prst="rect">
@@ -4183,7 +4447,7 @@
             <p:nvPr/>
           </p:nvPicPr>
           <p:blipFill>
-            <a:blip r:embed="rId7" cstate="print">
+            <a:blip r:embed="rId6" cstate="print">
               <a:extLst>
                 <a:ext uri="{28A0092B-C50C-407E-A947-70E740481C1C}">
                   <a14:useLocalDpi xmlns:a14="http://schemas.microsoft.com/office/drawing/2010/main" xmlns="" val="0"/>
@@ -4228,7 +4492,7 @@
             <p:nvPr/>
           </p:nvPicPr>
           <p:blipFill rotWithShape="1">
-            <a:blip r:embed="rId8" cstate="print">
+            <a:blip r:embed="rId7" cstate="print">
               <a:extLst>
                 <a:ext uri="{BEBA8EAE-BF5A-486C-A8C5-ECC9F3942E4B}">
                   <a14:imgProps xmlns:a14="http://schemas.microsoft.com/office/drawing/2010/main" xmlns="">
@@ -4507,264 +4771,14 @@
       </p:grpSp>
       <p:sp>
         <p:nvSpPr>
-          <p:cNvPr id="33" name="文字方塊 32"/>
-          <p:cNvSpPr txBox="1"/>
-          <p:nvPr/>
-        </p:nvSpPr>
-        <p:spPr>
-          <a:xfrm>
-            <a:off x="1332360" y="7003083"/>
-            <a:ext cx="13321480" cy="2800767"/>
-          </a:xfrm>
-          <a:prstGeom prst="rect">
-            <a:avLst/>
-          </a:prstGeom>
-          <a:noFill/>
-        </p:spPr>
-        <p:txBody>
-          <a:bodyPr wrap="square" rtlCol="0">
-            <a:spAutoFit/>
-          </a:bodyPr>
-          <a:lstStyle/>
-          <a:p>
-            <a:r>
-              <a:rPr lang="zh-TW" altLang="en-US" sz="4400" b="1" dirty="0" smtClean="0">
-                <a:ln w="10541" cmpd="sng">
-                  <a:solidFill>
-                    <a:schemeClr val="accent2">
-                      <a:lumMod val="50000"/>
-                    </a:schemeClr>
-                  </a:solidFill>
-                  <a:prstDash val="solid"/>
-                </a:ln>
-                <a:gradFill>
-                  <a:gsLst>
-                    <a:gs pos="0">
-                      <a:schemeClr val="accent2">
-                        <a:lumMod val="40000"/>
-                        <a:lumOff val="60000"/>
-                      </a:schemeClr>
-                    </a:gs>
-                    <a:gs pos="9000">
-                      <a:schemeClr val="accent2">
-                        <a:lumMod val="60000"/>
-                        <a:lumOff val="40000"/>
-                      </a:schemeClr>
-                    </a:gs>
-                    <a:gs pos="50000">
-                      <a:schemeClr val="accent2">
-                        <a:lumMod val="75000"/>
-                      </a:schemeClr>
-                    </a:gs>
-                    <a:gs pos="79000">
-                      <a:schemeClr val="accent2">
-                        <a:lumMod val="60000"/>
-                        <a:lumOff val="40000"/>
-                      </a:schemeClr>
-                    </a:gs>
-                    <a:gs pos="100000">
-                      <a:schemeClr val="accent2">
-                        <a:lumMod val="40000"/>
-                        <a:lumOff val="60000"/>
-                      </a:schemeClr>
-                    </a:gs>
-                  </a:gsLst>
-                  <a:lin ang="5400000"/>
-                </a:gradFill>
-              </a:rPr>
-              <a:t>＊</a:t>
-            </a:r>
-            <a:r>
-              <a:rPr lang="zh-TW" altLang="en-US" sz="4400" dirty="0" smtClean="0"/>
-              <a:t> </a:t>
-            </a:r>
-            <a:r>
-              <a:rPr lang="en-US" altLang="zh-TW" sz="4400" dirty="0" smtClean="0"/>
-              <a:t>Angry Runner </a:t>
-            </a:r>
-            <a:r>
-              <a:rPr lang="zh-TW" altLang="en-US" sz="4400" dirty="0" smtClean="0"/>
-              <a:t>利用手機內建的 </a:t>
-            </a:r>
-            <a:r>
-              <a:rPr lang="en-US" altLang="zh-TW" sz="4400" dirty="0" smtClean="0"/>
-              <a:t>GPS </a:t>
-            </a:r>
-            <a:r>
-              <a:rPr lang="zh-TW" altLang="en-US" sz="4400" dirty="0" smtClean="0"/>
-              <a:t>即時掌握您的運動時間、距離、和速度，並即時計算卡路里消耗量</a:t>
-            </a:r>
-            <a:r>
-              <a:rPr lang="zh-TW" altLang="en-US" sz="4400" dirty="0" smtClean="0"/>
-              <a:t>。</a:t>
-            </a:r>
-            <a:endParaRPr lang="en-US" altLang="zh-TW" sz="4400" dirty="0" smtClean="0"/>
-          </a:p>
-          <a:p>
-            <a:r>
-              <a:rPr lang="zh-TW" altLang="en-US" sz="4400" b="1" dirty="0" smtClean="0">
-                <a:ln w="10541" cmpd="sng">
-                  <a:solidFill>
-                    <a:schemeClr val="accent2">
-                      <a:lumMod val="50000"/>
-                    </a:schemeClr>
-                  </a:solidFill>
-                  <a:prstDash val="solid"/>
-                </a:ln>
-                <a:gradFill>
-                  <a:gsLst>
-                    <a:gs pos="0">
-                      <a:schemeClr val="accent2">
-                        <a:lumMod val="40000"/>
-                        <a:lumOff val="60000"/>
-                      </a:schemeClr>
-                    </a:gs>
-                    <a:gs pos="9000">
-                      <a:schemeClr val="accent2">
-                        <a:lumMod val="60000"/>
-                        <a:lumOff val="40000"/>
-                      </a:schemeClr>
-                    </a:gs>
-                    <a:gs pos="50000">
-                      <a:schemeClr val="accent2">
-                        <a:lumMod val="75000"/>
-                      </a:schemeClr>
-                    </a:gs>
-                    <a:gs pos="79000">
-                      <a:schemeClr val="accent2">
-                        <a:lumMod val="60000"/>
-                        <a:lumOff val="40000"/>
-                      </a:schemeClr>
-                    </a:gs>
-                    <a:gs pos="100000">
-                      <a:schemeClr val="accent2">
-                        <a:lumMod val="40000"/>
-                        <a:lumOff val="60000"/>
-                      </a:schemeClr>
-                    </a:gs>
-                  </a:gsLst>
-                  <a:lin ang="5400000"/>
-                </a:gradFill>
-              </a:rPr>
-              <a:t>＊</a:t>
-            </a:r>
-            <a:r>
-              <a:rPr lang="zh-TW" altLang="en-US" sz="4400" b="1" dirty="0" smtClean="0">
-                <a:ln w="10541" cmpd="sng">
-                  <a:solidFill>
-                    <a:schemeClr val="accent3">
-                      <a:lumMod val="50000"/>
-                    </a:schemeClr>
-                  </a:solidFill>
-                  <a:prstDash val="solid"/>
-                </a:ln>
-                <a:gradFill>
-                  <a:gsLst>
-                    <a:gs pos="0">
-                      <a:schemeClr val="accent3">
-                        <a:lumMod val="40000"/>
-                        <a:lumOff val="60000"/>
-                      </a:schemeClr>
-                    </a:gs>
-                    <a:gs pos="9000">
-                      <a:schemeClr val="accent3">
-                        <a:lumMod val="60000"/>
-                        <a:lumOff val="40000"/>
-                      </a:schemeClr>
-                    </a:gs>
-                    <a:gs pos="50000">
-                      <a:schemeClr val="accent3">
-                        <a:lumMod val="75000"/>
-                      </a:schemeClr>
-                    </a:gs>
-                    <a:gs pos="79000">
-                      <a:schemeClr val="accent3">
-                        <a:lumMod val="60000"/>
-                        <a:lumOff val="40000"/>
-                      </a:schemeClr>
-                    </a:gs>
-                    <a:gs pos="100000">
-                      <a:schemeClr val="accent3">
-                        <a:lumMod val="40000"/>
-                        <a:lumOff val="60000"/>
-                      </a:schemeClr>
-                    </a:gs>
-                  </a:gsLst>
-                  <a:lin ang="5400000"/>
-                </a:gradFill>
-              </a:rPr>
-              <a:t> </a:t>
-            </a:r>
-            <a:r>
-              <a:rPr lang="en-US" altLang="zh-TW" sz="4400" dirty="0" smtClean="0"/>
-              <a:t>Angry Runner </a:t>
-            </a:r>
-            <a:r>
-              <a:rPr lang="zh-TW" altLang="en-US" sz="4400" dirty="0" smtClean="0"/>
-              <a:t>會依您運動的速度自動調整音樂的音量，提醒您保持適當地運動速度。</a:t>
-            </a:r>
-            <a:endParaRPr lang="zh-TW" altLang="en-US" sz="4400" dirty="0"/>
-          </a:p>
-        </p:txBody>
-      </p:sp>
-      <p:sp>
-        <p:nvSpPr>
-          <p:cNvPr id="34" name="圓角矩形 33"/>
-          <p:cNvSpPr/>
-          <p:nvPr/>
-        </p:nvSpPr>
-        <p:spPr>
-          <a:xfrm>
-            <a:off x="1260352" y="7003083"/>
-            <a:ext cx="13393488" cy="2808312"/>
-          </a:xfrm>
-          <a:prstGeom prst="roundRect">
-            <a:avLst>
-              <a:gd name="adj" fmla="val 14039"/>
-            </a:avLst>
-          </a:prstGeom>
-          <a:noFill/>
-          <a:ln>
-            <a:solidFill>
-              <a:schemeClr val="accent2"/>
-            </a:solidFill>
-          </a:ln>
-        </p:spPr>
-        <p:style>
-          <a:lnRef idx="2">
-            <a:schemeClr val="accent1">
-              <a:shade val="50000"/>
-            </a:schemeClr>
-          </a:lnRef>
-          <a:fillRef idx="1">
-            <a:schemeClr val="accent1"/>
-          </a:fillRef>
-          <a:effectRef idx="0">
-            <a:schemeClr val="accent1"/>
-          </a:effectRef>
-          <a:fontRef idx="minor">
-            <a:schemeClr val="lt1"/>
-          </a:fontRef>
-        </p:style>
-        <p:txBody>
-          <a:bodyPr rtlCol="0" anchor="ctr"/>
-          <a:lstStyle/>
-          <a:p>
-            <a:pPr algn="ctr"/>
-            <a:endParaRPr lang="zh-TW" altLang="en-US"/>
-          </a:p>
-        </p:txBody>
-      </p:sp>
-      <p:sp>
-        <p:nvSpPr>
           <p:cNvPr id="35" name="文字方塊 34"/>
           <p:cNvSpPr txBox="1"/>
           <p:nvPr/>
         </p:nvSpPr>
         <p:spPr>
           <a:xfrm>
-            <a:off x="15121384" y="16076091"/>
-            <a:ext cx="4896544" cy="4154984"/>
+            <a:off x="15085888" y="16169579"/>
+            <a:ext cx="5256584" cy="4154984"/>
           </a:xfrm>
           <a:prstGeom prst="rect">
             <a:avLst/>
@@ -4879,11 +4893,7 @@
             </a:r>
             <a:r>
               <a:rPr lang="zh-TW" altLang="en-US" sz="4400" dirty="0" smtClean="0"/>
-              <a:t>會在您開始運動時自動播放音樂</a:t>
-            </a:r>
-            <a:r>
-              <a:rPr lang="zh-TW" altLang="en-US" sz="4400" dirty="0" smtClean="0"/>
-              <a:t>。</a:t>
+              <a:t>會在您開始運動時自動播放音樂。</a:t>
             </a:r>
             <a:endParaRPr lang="en-US" altLang="zh-TW" sz="4400" dirty="0" smtClean="0"/>
           </a:p>
@@ -4961,8 +4971,8 @@
         </p:nvSpPr>
         <p:spPr>
           <a:xfrm>
-            <a:off x="15156880" y="16148099"/>
-            <a:ext cx="4861048" cy="4104456"/>
+            <a:off x="14941872" y="15860067"/>
+            <a:ext cx="5544616" cy="4968552"/>
           </a:xfrm>
           <a:prstGeom prst="roundRect">
             <a:avLst>
@@ -5005,7 +5015,7 @@
         </p:nvSpPr>
         <p:spPr>
           <a:xfrm>
-            <a:off x="7093000" y="10315451"/>
+            <a:off x="6588944" y="10531475"/>
             <a:ext cx="7560840" cy="2123658"/>
           </a:xfrm>
           <a:prstGeom prst="rect">
@@ -5076,55 +5086,9 @@
             </a:r>
             <a:r>
               <a:rPr lang="zh-TW" altLang="en-US" sz="4400" dirty="0" smtClean="0"/>
-              <a:t>指定運動時播放的音樂清單，或建立新的音樂清單</a:t>
-            </a:r>
-            <a:r>
-              <a:rPr lang="zh-TW" altLang="en-US" sz="4400" dirty="0" smtClean="0"/>
-              <a:t>。</a:t>
+              <a:t>指定運動時播放的音樂清單，或建立新的音樂清單。</a:t>
             </a:r>
             <a:endParaRPr lang="en-US" altLang="zh-TW" sz="4400" dirty="0" smtClean="0"/>
-          </a:p>
-        </p:txBody>
-      </p:sp>
-      <p:sp>
-        <p:nvSpPr>
-          <p:cNvPr id="38" name="圓角矩形 37"/>
-          <p:cNvSpPr/>
-          <p:nvPr/>
-        </p:nvSpPr>
-        <p:spPr>
-          <a:xfrm>
-            <a:off x="7093000" y="10315451"/>
-            <a:ext cx="7560840" cy="2160240"/>
-          </a:xfrm>
-          <a:prstGeom prst="roundRect">
-            <a:avLst>
-              <a:gd name="adj" fmla="val 13325"/>
-            </a:avLst>
-          </a:prstGeom>
-          <a:noFill/>
-          <a:ln w="38100"/>
-        </p:spPr>
-        <p:style>
-          <a:lnRef idx="2">
-            <a:schemeClr val="accent3"/>
-          </a:lnRef>
-          <a:fillRef idx="1">
-            <a:schemeClr val="lt1"/>
-          </a:fillRef>
-          <a:effectRef idx="0">
-            <a:schemeClr val="accent3"/>
-          </a:effectRef>
-          <a:fontRef idx="minor">
-            <a:schemeClr val="dk1"/>
-          </a:fontRef>
-        </p:style>
-        <p:txBody>
-          <a:bodyPr rtlCol="0" anchor="ctr"/>
-          <a:lstStyle/>
-          <a:p>
-            <a:pPr algn="ctr"/>
-            <a:endParaRPr lang="zh-TW" altLang="en-US"/>
           </a:p>
         </p:txBody>
       </p:sp>
@@ -5136,7 +5100,7 @@
         </p:nvSpPr>
         <p:spPr>
           <a:xfrm>
-            <a:off x="1260352" y="19604483"/>
+            <a:off x="1656904" y="19388459"/>
             <a:ext cx="6347263" cy="2123658"/>
           </a:xfrm>
           <a:prstGeom prst="rect">
@@ -5213,45 +5177,431 @@
           </a:p>
         </p:txBody>
       </p:sp>
-      <p:sp>
-        <p:nvSpPr>
-          <p:cNvPr id="40" name="圓角矩形 39"/>
-          <p:cNvSpPr/>
+      <p:grpSp>
+        <p:nvGrpSpPr>
+          <p:cNvPr id="55" name="群組 54"/>
+          <p:cNvGrpSpPr/>
+          <p:nvPr/>
+        </p:nvGrpSpPr>
+        <p:grpSpPr>
+          <a:xfrm>
+            <a:off x="1260352" y="6859066"/>
+            <a:ext cx="19226136" cy="8280921"/>
+            <a:chOff x="1260352" y="6859066"/>
+            <a:chExt cx="19226136" cy="8280921"/>
+          </a:xfrm>
+        </p:grpSpPr>
+        <p:sp>
+          <p:nvSpPr>
+            <p:cNvPr id="41" name="圓角矩形 40"/>
+            <p:cNvSpPr/>
+            <p:nvPr/>
+          </p:nvSpPr>
+          <p:spPr>
+            <a:xfrm>
+              <a:off x="14941872" y="6859066"/>
+              <a:ext cx="5544616" cy="8280921"/>
+            </a:xfrm>
+            <a:prstGeom prst="roundRect">
+              <a:avLst>
+                <a:gd name="adj" fmla="val 7628"/>
+              </a:avLst>
+            </a:prstGeom>
+            <a:noFill/>
+            <a:ln w="38100">
+              <a:solidFill>
+                <a:schemeClr val="accent2"/>
+              </a:solidFill>
+            </a:ln>
+          </p:spPr>
+          <p:style>
+            <a:lnRef idx="2">
+              <a:schemeClr val="accent1">
+                <a:shade val="50000"/>
+              </a:schemeClr>
+            </a:lnRef>
+            <a:fillRef idx="1">
+              <a:schemeClr val="accent1"/>
+            </a:fillRef>
+            <a:effectRef idx="0">
+              <a:schemeClr val="accent1"/>
+            </a:effectRef>
+            <a:fontRef idx="minor">
+              <a:schemeClr val="lt1"/>
+            </a:fontRef>
+          </p:style>
+          <p:txBody>
+            <a:bodyPr rtlCol="0" anchor="ctr"/>
+            <a:lstStyle/>
+            <a:p>
+              <a:pPr algn="ctr"/>
+              <a:endParaRPr lang="zh-TW" altLang="en-US"/>
+            </a:p>
+          </p:txBody>
+        </p:sp>
+        <p:sp>
+          <p:nvSpPr>
+            <p:cNvPr id="34" name="圓角矩形 33"/>
+            <p:cNvSpPr/>
+            <p:nvPr/>
+          </p:nvSpPr>
+          <p:spPr>
+            <a:xfrm>
+              <a:off x="1260352" y="6859067"/>
+              <a:ext cx="14761640" cy="3024336"/>
+            </a:xfrm>
+            <a:prstGeom prst="roundRect">
+              <a:avLst>
+                <a:gd name="adj" fmla="val 14039"/>
+              </a:avLst>
+            </a:prstGeom>
+            <a:noFill/>
+            <a:ln w="38100">
+              <a:solidFill>
+                <a:schemeClr val="accent2"/>
+              </a:solidFill>
+              <a:round/>
+            </a:ln>
+          </p:spPr>
+          <p:style>
+            <a:lnRef idx="2">
+              <a:schemeClr val="accent1">
+                <a:shade val="50000"/>
+              </a:schemeClr>
+            </a:lnRef>
+            <a:fillRef idx="1">
+              <a:schemeClr val="accent1"/>
+            </a:fillRef>
+            <a:effectRef idx="0">
+              <a:schemeClr val="accent1"/>
+            </a:effectRef>
+            <a:fontRef idx="minor">
+              <a:schemeClr val="lt1"/>
+            </a:fontRef>
+          </p:style>
+          <p:txBody>
+            <a:bodyPr rtlCol="0" anchor="ctr"/>
+            <a:lstStyle/>
+            <a:p>
+              <a:pPr algn="ctr"/>
+              <a:endParaRPr lang="zh-TW" altLang="en-US"/>
+            </a:p>
+          </p:txBody>
+        </p:sp>
+        <p:sp>
+          <p:nvSpPr>
+            <p:cNvPr id="42" name="矩形 41"/>
+            <p:cNvSpPr/>
+            <p:nvPr/>
+          </p:nvSpPr>
+          <p:spPr>
+            <a:xfrm>
+              <a:off x="14581832" y="6878117"/>
+              <a:ext cx="1440160" cy="3365326"/>
+            </a:xfrm>
+            <a:prstGeom prst="rect">
+              <a:avLst/>
+            </a:prstGeom>
+            <a:solidFill>
+              <a:schemeClr val="bg1"/>
+            </a:solidFill>
+            <a:ln>
+              <a:noFill/>
+            </a:ln>
+          </p:spPr>
+          <p:style>
+            <a:lnRef idx="2">
+              <a:schemeClr val="accent1">
+                <a:shade val="50000"/>
+              </a:schemeClr>
+            </a:lnRef>
+            <a:fillRef idx="1">
+              <a:schemeClr val="accent1"/>
+            </a:fillRef>
+            <a:effectRef idx="0">
+              <a:schemeClr val="accent1"/>
+            </a:effectRef>
+            <a:fontRef idx="minor">
+              <a:schemeClr val="lt1"/>
+            </a:fontRef>
+          </p:style>
+          <p:txBody>
+            <a:bodyPr rtlCol="0" anchor="ctr"/>
+            <a:lstStyle/>
+            <a:p>
+              <a:pPr algn="ctr"/>
+              <a:endParaRPr lang="en-US"/>
+            </a:p>
+          </p:txBody>
+        </p:sp>
+        <p:sp>
+          <p:nvSpPr>
+            <p:cNvPr id="43" name="弧形 42"/>
+            <p:cNvSpPr/>
+            <p:nvPr/>
+          </p:nvSpPr>
+          <p:spPr>
+            <a:xfrm>
+              <a:off x="14149784" y="9883403"/>
+              <a:ext cx="792000" cy="792000"/>
+            </a:xfrm>
+            <a:prstGeom prst="arc">
+              <a:avLst/>
+            </a:prstGeom>
+            <a:ln w="38100"/>
+          </p:spPr>
+          <p:style>
+            <a:lnRef idx="1">
+              <a:schemeClr val="accent2"/>
+            </a:lnRef>
+            <a:fillRef idx="0">
+              <a:schemeClr val="accent2"/>
+            </a:fillRef>
+            <a:effectRef idx="0">
+              <a:schemeClr val="accent2"/>
+            </a:effectRef>
+            <a:fontRef idx="minor">
+              <a:schemeClr val="tx1"/>
+            </a:fontRef>
+          </p:style>
+          <p:txBody>
+            <a:bodyPr rtlCol="0" anchor="ctr"/>
+            <a:lstStyle/>
+            <a:p>
+              <a:pPr algn="ctr"/>
+              <a:endParaRPr lang="en-US"/>
+            </a:p>
+          </p:txBody>
+        </p:sp>
+      </p:grpSp>
+      <p:pic>
+        <p:nvPicPr>
+          <p:cNvPr id="17" name="Picture 4" descr="C:\Documents and Settings\user\桌面\MobileProgramming\project\screenshot\device-2011-12-22-145919_gmap.png"/>
+          <p:cNvPicPr>
+            <a:picLocks noChangeAspect="1" noChangeArrowheads="1"/>
+          </p:cNvPicPr>
+          <p:nvPr/>
+        </p:nvPicPr>
+        <p:blipFill>
+          <a:blip r:embed="rId16" cstate="print"/>
+          <a:stretch>
+            <a:fillRect/>
+          </a:stretch>
+        </p:blipFill>
+        <p:spPr bwMode="auto">
+          <a:xfrm>
+            <a:off x="15445928" y="7159947"/>
+            <a:ext cx="4572000" cy="7620000"/>
+          </a:xfrm>
+          <a:prstGeom prst="rect">
+            <a:avLst/>
+          </a:prstGeom>
+          <a:noFill/>
+          <a:ln w="38100">
+            <a:solidFill>
+              <a:schemeClr val="accent2">
+                <a:lumMod val="60000"/>
+                <a:lumOff val="40000"/>
+              </a:schemeClr>
+            </a:solidFill>
+          </a:ln>
+        </p:spPr>
+      </p:pic>
+      <p:sp>
+        <p:nvSpPr>
+          <p:cNvPr id="33" name="文字方塊 32"/>
+          <p:cNvSpPr txBox="1"/>
           <p:nvPr/>
         </p:nvSpPr>
         <p:spPr>
           <a:xfrm>
-            <a:off x="1260352" y="19676491"/>
-            <a:ext cx="6912768" cy="2016224"/>
+            <a:off x="1332360" y="7003083"/>
+            <a:ext cx="13321480" cy="2800767"/>
           </a:xfrm>
-          <a:prstGeom prst="roundRect">
-            <a:avLst>
-              <a:gd name="adj" fmla="val 13087"/>
-            </a:avLst>
+          <a:prstGeom prst="rect">
+            <a:avLst/>
           </a:prstGeom>
           <a:noFill/>
-          <a:ln w="38100"/>
         </p:spPr>
-        <p:style>
-          <a:lnRef idx="2">
-            <a:schemeClr val="accent4"/>
-          </a:lnRef>
-          <a:fillRef idx="1">
-            <a:schemeClr val="lt1"/>
-          </a:fillRef>
-          <a:effectRef idx="0">
-            <a:schemeClr val="accent4"/>
-          </a:effectRef>
-          <a:fontRef idx="minor">
-            <a:schemeClr val="dk1"/>
-          </a:fontRef>
-        </p:style>
-        <p:txBody>
-          <a:bodyPr rtlCol="0" anchor="ctr"/>
+        <p:txBody>
+          <a:bodyPr wrap="square" rtlCol="0">
+            <a:spAutoFit/>
+          </a:bodyPr>
           <a:lstStyle/>
           <a:p>
-            <a:pPr algn="ctr"/>
-            <a:endParaRPr lang="zh-TW" altLang="en-US"/>
+            <a:r>
+              <a:rPr lang="zh-TW" altLang="en-US" sz="4400" b="1" dirty="0" smtClean="0">
+                <a:ln w="10541" cmpd="sng">
+                  <a:solidFill>
+                    <a:schemeClr val="accent2">
+                      <a:lumMod val="50000"/>
+                    </a:schemeClr>
+                  </a:solidFill>
+                  <a:prstDash val="solid"/>
+                </a:ln>
+                <a:gradFill>
+                  <a:gsLst>
+                    <a:gs pos="0">
+                      <a:schemeClr val="accent2">
+                        <a:lumMod val="40000"/>
+                        <a:lumOff val="60000"/>
+                      </a:schemeClr>
+                    </a:gs>
+                    <a:gs pos="9000">
+                      <a:schemeClr val="accent2">
+                        <a:lumMod val="60000"/>
+                        <a:lumOff val="40000"/>
+                      </a:schemeClr>
+                    </a:gs>
+                    <a:gs pos="50000">
+                      <a:schemeClr val="accent2">
+                        <a:lumMod val="75000"/>
+                      </a:schemeClr>
+                    </a:gs>
+                    <a:gs pos="79000">
+                      <a:schemeClr val="accent2">
+                        <a:lumMod val="60000"/>
+                        <a:lumOff val="40000"/>
+                      </a:schemeClr>
+                    </a:gs>
+                    <a:gs pos="100000">
+                      <a:schemeClr val="accent2">
+                        <a:lumMod val="40000"/>
+                        <a:lumOff val="60000"/>
+                      </a:schemeClr>
+                    </a:gs>
+                  </a:gsLst>
+                  <a:lin ang="5400000"/>
+                </a:gradFill>
+              </a:rPr>
+              <a:t>＊</a:t>
+            </a:r>
+            <a:r>
+              <a:rPr lang="zh-TW" altLang="en-US" sz="4400" dirty="0" smtClean="0"/>
+              <a:t> </a:t>
+            </a:r>
+            <a:r>
+              <a:rPr lang="en-US" altLang="zh-TW" sz="4400" dirty="0" smtClean="0"/>
+              <a:t>Angry Runner </a:t>
+            </a:r>
+            <a:r>
+              <a:rPr lang="zh-TW" altLang="en-US" sz="4400" dirty="0" smtClean="0"/>
+              <a:t>利用手機內建的 </a:t>
+            </a:r>
+            <a:r>
+              <a:rPr lang="en-US" altLang="zh-TW" sz="4400" dirty="0" smtClean="0"/>
+              <a:t>GPS </a:t>
+            </a:r>
+            <a:r>
+              <a:rPr lang="zh-TW" altLang="en-US" sz="4400" dirty="0" smtClean="0"/>
+              <a:t>即時掌握您的運動時間、距離、和速度，並即時計算卡路里消耗量。</a:t>
+            </a:r>
+            <a:endParaRPr lang="en-US" altLang="zh-TW" sz="4400" dirty="0" smtClean="0"/>
+          </a:p>
+          <a:p>
+            <a:r>
+              <a:rPr lang="zh-TW" altLang="en-US" sz="4400" b="1" dirty="0" smtClean="0">
+                <a:ln w="10541" cmpd="sng">
+                  <a:solidFill>
+                    <a:schemeClr val="accent2">
+                      <a:lumMod val="50000"/>
+                    </a:schemeClr>
+                  </a:solidFill>
+                  <a:prstDash val="solid"/>
+                </a:ln>
+                <a:gradFill>
+                  <a:gsLst>
+                    <a:gs pos="0">
+                      <a:schemeClr val="accent2">
+                        <a:lumMod val="40000"/>
+                        <a:lumOff val="60000"/>
+                      </a:schemeClr>
+                    </a:gs>
+                    <a:gs pos="9000">
+                      <a:schemeClr val="accent2">
+                        <a:lumMod val="60000"/>
+                        <a:lumOff val="40000"/>
+                      </a:schemeClr>
+                    </a:gs>
+                    <a:gs pos="50000">
+                      <a:schemeClr val="accent2">
+                        <a:lumMod val="75000"/>
+                      </a:schemeClr>
+                    </a:gs>
+                    <a:gs pos="79000">
+                      <a:schemeClr val="accent2">
+                        <a:lumMod val="60000"/>
+                        <a:lumOff val="40000"/>
+                      </a:schemeClr>
+                    </a:gs>
+                    <a:gs pos="100000">
+                      <a:schemeClr val="accent2">
+                        <a:lumMod val="40000"/>
+                        <a:lumOff val="60000"/>
+                      </a:schemeClr>
+                    </a:gs>
+                  </a:gsLst>
+                  <a:lin ang="5400000"/>
+                </a:gradFill>
+              </a:rPr>
+              <a:t>＊</a:t>
+            </a:r>
+            <a:r>
+              <a:rPr lang="zh-TW" altLang="en-US" sz="4400" b="1" dirty="0" smtClean="0">
+                <a:ln w="10541" cmpd="sng">
+                  <a:solidFill>
+                    <a:schemeClr val="accent3">
+                      <a:lumMod val="50000"/>
+                    </a:schemeClr>
+                  </a:solidFill>
+                  <a:prstDash val="solid"/>
+                </a:ln>
+                <a:gradFill>
+                  <a:gsLst>
+                    <a:gs pos="0">
+                      <a:schemeClr val="accent3">
+                        <a:lumMod val="40000"/>
+                        <a:lumOff val="60000"/>
+                      </a:schemeClr>
+                    </a:gs>
+                    <a:gs pos="9000">
+                      <a:schemeClr val="accent3">
+                        <a:lumMod val="60000"/>
+                        <a:lumOff val="40000"/>
+                      </a:schemeClr>
+                    </a:gs>
+                    <a:gs pos="50000">
+                      <a:schemeClr val="accent3">
+                        <a:lumMod val="75000"/>
+                      </a:schemeClr>
+                    </a:gs>
+                    <a:gs pos="79000">
+                      <a:schemeClr val="accent3">
+                        <a:lumMod val="60000"/>
+                        <a:lumOff val="40000"/>
+                      </a:schemeClr>
+                    </a:gs>
+                    <a:gs pos="100000">
+                      <a:schemeClr val="accent3">
+                        <a:lumMod val="40000"/>
+                        <a:lumOff val="60000"/>
+                      </a:schemeClr>
+                    </a:gs>
+                  </a:gsLst>
+                  <a:lin ang="5400000"/>
+                </a:gradFill>
+              </a:rPr>
+              <a:t> </a:t>
+            </a:r>
+            <a:r>
+              <a:rPr lang="en-US" altLang="zh-TW" sz="4400" dirty="0" smtClean="0"/>
+              <a:t>Angry Runner </a:t>
+            </a:r>
+            <a:r>
+              <a:rPr lang="zh-TW" altLang="en-US" sz="4400" dirty="0" smtClean="0"/>
+              <a:t>會依您運動的速度自動調整音樂的音量，提醒您保持適當地運動速度。</a:t>
+            </a:r>
+            <a:endParaRPr lang="zh-TW" altLang="en-US" sz="4400" dirty="0"/>
           </a:p>
         </p:txBody>
       </p:sp>

</xml_diff>

<commit_message>
Small change of poster.
</commit_message>
<xml_diff>
--- a/poster.pptx
+++ b/poster.pptx
@@ -3076,8 +3076,8 @@
         </p:nvSpPr>
         <p:spPr>
           <a:xfrm>
-            <a:off x="1620392" y="954412"/>
-            <a:ext cx="18178780" cy="3096344"/>
+            <a:off x="1404368" y="810395"/>
+            <a:ext cx="18394804" cy="3240361"/>
           </a:xfrm>
         </p:spPr>
         <p:txBody>
@@ -3301,14 +3301,7 @@
                 <a:latin typeface="標楷體" pitchFamily="65" charset="-120"/>
                 <a:ea typeface="標楷體" pitchFamily="65" charset="-120"/>
               </a:rPr>
-              <a:t>陳彥</a:t>
-            </a:r>
-            <a:r>
-              <a:rPr lang="zh-TW" altLang="en-US" sz="4800" dirty="0" smtClean="0">
-                <a:latin typeface="標楷體" pitchFamily="65" charset="-120"/>
-                <a:ea typeface="標楷體" pitchFamily="65" charset="-120"/>
-              </a:rPr>
-              <a:t>仰教授</a:t>
+              <a:t>陳彥仰教授</a:t>
             </a:r>
             <a:endParaRPr lang="zh-TW" altLang="en-US" sz="4800" dirty="0">
               <a:latin typeface="標楷體" pitchFamily="65" charset="-120"/>
@@ -3509,7 +3502,7 @@
             </a:duotone>
             <a:extLst>
               <a:ext uri="{BEBA8EAE-BF5A-486C-A8C5-ECC9F3942E4B}">
-                <a14:imgProps xmlns:a14="http://schemas.microsoft.com/office/drawing/2010/main" xmlns="">
+                <a14:imgProps xmlns="" xmlns:a14="http://schemas.microsoft.com/office/drawing/2010/main">
                   <a14:imgLayer r:embed="rId5">
                     <a14:imgEffect>
                       <a14:sharpenSoften amount="50000"/>
@@ -3518,7 +3511,7 @@
                 </a14:imgProps>
               </a:ext>
               <a:ext uri="{28A0092B-C50C-407E-A947-70E740481C1C}">
-                <a14:useLocalDpi xmlns:a14="http://schemas.microsoft.com/office/drawing/2010/main" xmlns="" val="0"/>
+                <a14:useLocalDpi xmlns="" xmlns:a14="http://schemas.microsoft.com/office/drawing/2010/main" val="0"/>
               </a:ext>
             </a:extLst>
           </a:blip>
@@ -3568,7 +3561,7 @@
             </a:duotone>
             <a:extLst>
               <a:ext uri="{BEBA8EAE-BF5A-486C-A8C5-ECC9F3942E4B}">
-                <a14:imgProps xmlns:a14="http://schemas.microsoft.com/office/drawing/2010/main" xmlns="">
+                <a14:imgProps xmlns="" xmlns:a14="http://schemas.microsoft.com/office/drawing/2010/main">
                   <a14:imgLayer r:embed="rId7">
                     <a14:imgEffect>
                       <a14:sharpenSoften amount="50000"/>
@@ -3577,7 +3570,7 @@
                 </a14:imgProps>
               </a:ext>
               <a:ext uri="{28A0092B-C50C-407E-A947-70E740481C1C}">
-                <a14:useLocalDpi xmlns:a14="http://schemas.microsoft.com/office/drawing/2010/main" xmlns="" val="0"/>
+                <a14:useLocalDpi xmlns="" xmlns:a14="http://schemas.microsoft.com/office/drawing/2010/main" val="0"/>
               </a:ext>
             </a:extLst>
           </a:blip>
@@ -3627,7 +3620,7 @@
             </a:duotone>
             <a:extLst>
               <a:ext uri="{BEBA8EAE-BF5A-486C-A8C5-ECC9F3942E4B}">
-                <a14:imgProps xmlns:a14="http://schemas.microsoft.com/office/drawing/2010/main" xmlns="">
+                <a14:imgProps xmlns="" xmlns:a14="http://schemas.microsoft.com/office/drawing/2010/main">
                   <a14:imgLayer r:embed="rId10">
                     <a14:imgEffect>
                       <a14:sharpenSoften amount="50000"/>
@@ -3636,7 +3629,7 @@
                 </a14:imgProps>
               </a:ext>
               <a:ext uri="{28A0092B-C50C-407E-A947-70E740481C1C}">
-                <a14:useLocalDpi xmlns:a14="http://schemas.microsoft.com/office/drawing/2010/main" xmlns="" val="0"/>
+                <a14:useLocalDpi xmlns="" xmlns:a14="http://schemas.microsoft.com/office/drawing/2010/main" val="0"/>
               </a:ext>
             </a:extLst>
           </a:blip>
@@ -3700,7 +3693,7 @@
               </a:duotone>
               <a:extLst>
                 <a:ext uri="{BEBA8EAE-BF5A-486C-A8C5-ECC9F3942E4B}">
-                  <a14:imgProps xmlns:a14="http://schemas.microsoft.com/office/drawing/2010/main" xmlns="">
+                  <a14:imgProps xmlns="" xmlns:a14="http://schemas.microsoft.com/office/drawing/2010/main">
                     <a14:imgLayer r:embed="rId3">
                       <a14:imgEffect>
                         <a14:sharpenSoften amount="25000"/>
@@ -3709,7 +3702,7 @@
                   </a14:imgProps>
                 </a:ext>
                 <a:ext uri="{28A0092B-C50C-407E-A947-70E740481C1C}">
-                  <a14:useLocalDpi xmlns:a14="http://schemas.microsoft.com/office/drawing/2010/main" xmlns="" val="0"/>
+                  <a14:useLocalDpi xmlns="" xmlns:a14="http://schemas.microsoft.com/office/drawing/2010/main" val="0"/>
                 </a:ext>
               </a:extLst>
             </a:blip>
@@ -3759,7 +3752,7 @@
               </a:duotone>
               <a:extLst>
                 <a:ext uri="{28A0092B-C50C-407E-A947-70E740481C1C}">
-                  <a14:useLocalDpi xmlns:a14="http://schemas.microsoft.com/office/drawing/2010/main" xmlns="" val="0"/>
+                  <a14:useLocalDpi xmlns="" xmlns:a14="http://schemas.microsoft.com/office/drawing/2010/main" val="0"/>
                 </a:ext>
               </a:extLst>
             </a:blip>
@@ -3810,12 +3803,12 @@
               </a:duotone>
               <a:extLst>
                 <a:ext uri="{BEBA8EAE-BF5A-486C-A8C5-ECC9F3942E4B}">
-                  <a14:imgProps xmlns:a14="http://schemas.microsoft.com/office/drawing/2010/main" xmlns="">
+                  <a14:imgProps xmlns="" xmlns:a14="http://schemas.microsoft.com/office/drawing/2010/main">
                     <a14:imgLayer r:embed="rId14"/>
                   </a14:imgProps>
                 </a:ext>
                 <a:ext uri="{28A0092B-C50C-407E-A947-70E740481C1C}">
-                  <a14:useLocalDpi xmlns:a14="http://schemas.microsoft.com/office/drawing/2010/main" xmlns="" val="0"/>
+                  <a14:useLocalDpi xmlns="" xmlns:a14="http://schemas.microsoft.com/office/drawing/2010/main" val="0"/>
                 </a:ext>
               </a:extLst>
             </a:blip>
@@ -3875,7 +3868,7 @@
             <a:blip r:embed="rId12" cstate="print">
               <a:extLst>
                 <a:ext uri="{28A0092B-C50C-407E-A947-70E740481C1C}">
-                  <a14:useLocalDpi xmlns:a14="http://schemas.microsoft.com/office/drawing/2010/main" xmlns="" val="0"/>
+                  <a14:useLocalDpi xmlns="" xmlns:a14="http://schemas.microsoft.com/office/drawing/2010/main" val="0"/>
                 </a:ext>
               </a:extLst>
             </a:blip>
@@ -3909,7 +3902,7 @@
             </a:effectLst>
             <a:extLst>
               <a:ext uri="{909E8E84-426E-40DD-AFC4-6F175D3DCCD1}">
-                <a14:hiddenFill xmlns:a14="http://schemas.microsoft.com/office/drawing/2010/main" xmlns="">
+                <a14:hiddenFill xmlns="" xmlns:a14="http://schemas.microsoft.com/office/drawing/2010/main">
                   <a:solidFill>
                     <a:srgbClr val="FFFFFF"/>
                   </a:solidFill>
@@ -3930,7 +3923,7 @@
             <a:blip r:embed="rId15" cstate="print">
               <a:extLst>
                 <a:ext uri="{BEBA8EAE-BF5A-486C-A8C5-ECC9F3942E4B}">
-                  <a14:imgProps xmlns:a14="http://schemas.microsoft.com/office/drawing/2010/main" xmlns="">
+                  <a14:imgProps xmlns="" xmlns:a14="http://schemas.microsoft.com/office/drawing/2010/main">
                     <a14:imgLayer r:embed="rId16">
                       <a14:imgEffect>
                         <a14:sharpenSoften amount="50000"/>
@@ -3939,7 +3932,7 @@
                   </a14:imgProps>
                 </a:ext>
                 <a:ext uri="{28A0092B-C50C-407E-A947-70E740481C1C}">
-                  <a14:useLocalDpi xmlns:a14="http://schemas.microsoft.com/office/drawing/2010/main" xmlns="" val="0"/>
+                  <a14:useLocalDpi xmlns="" xmlns:a14="http://schemas.microsoft.com/office/drawing/2010/main" val="0"/>
                 </a:ext>
               </a:extLst>
             </a:blip>
@@ -3972,7 +3965,7 @@
             </a:effectLst>
             <a:extLst>
               <a:ext uri="{909E8E84-426E-40DD-AFC4-6F175D3DCCD1}">
-                <a14:hiddenFill xmlns:a14="http://schemas.microsoft.com/office/drawing/2010/main" xmlns="">
+                <a14:hiddenFill xmlns="" xmlns:a14="http://schemas.microsoft.com/office/drawing/2010/main">
                   <a:solidFill>
                     <a:srgbClr val="FFFFFF"/>
                   </a:solidFill>
@@ -3993,7 +3986,7 @@
             <a:blip r:embed="rId6" cstate="print">
               <a:extLst>
                 <a:ext uri="{BEBA8EAE-BF5A-486C-A8C5-ECC9F3942E4B}">
-                  <a14:imgProps xmlns:a14="http://schemas.microsoft.com/office/drawing/2010/main" xmlns="">
+                  <a14:imgProps xmlns="" xmlns:a14="http://schemas.microsoft.com/office/drawing/2010/main">
                     <a14:imgLayer r:embed="rId7">
                       <a14:imgEffect>
                         <a14:sharpenSoften amount="50000"/>
@@ -4002,7 +3995,7 @@
                   </a14:imgProps>
                 </a:ext>
                 <a:ext uri="{28A0092B-C50C-407E-A947-70E740481C1C}">
-                  <a14:useLocalDpi xmlns:a14="http://schemas.microsoft.com/office/drawing/2010/main" xmlns="" val="0"/>
+                  <a14:useLocalDpi xmlns="" xmlns:a14="http://schemas.microsoft.com/office/drawing/2010/main" val="0"/>
                 </a:ext>
               </a:extLst>
             </a:blip>
@@ -4037,7 +4030,7 @@
             </a:effectLst>
             <a:extLst>
               <a:ext uri="{909E8E84-426E-40DD-AFC4-6F175D3DCCD1}">
-                <a14:hiddenFill xmlns:a14="http://schemas.microsoft.com/office/drawing/2010/main" xmlns="">
+                <a14:hiddenFill xmlns="" xmlns:a14="http://schemas.microsoft.com/office/drawing/2010/main">
                   <a:solidFill>
                     <a:srgbClr val="FFFFFF"/>
                   </a:solidFill>
@@ -4058,7 +4051,7 @@
             <a:blip r:embed="rId8" cstate="print">
               <a:extLst>
                 <a:ext uri="{BEBA8EAE-BF5A-486C-A8C5-ECC9F3942E4B}">
-                  <a14:imgProps xmlns:a14="http://schemas.microsoft.com/office/drawing/2010/main" xmlns="">
+                  <a14:imgProps xmlns="" xmlns:a14="http://schemas.microsoft.com/office/drawing/2010/main">
                     <a14:imgLayer r:embed="rId10">
                       <a14:imgEffect>
                         <a14:sharpenSoften amount="50000"/>
@@ -4067,7 +4060,7 @@
                   </a14:imgProps>
                 </a:ext>
                 <a:ext uri="{28A0092B-C50C-407E-A947-70E740481C1C}">
-                  <a14:useLocalDpi xmlns:a14="http://schemas.microsoft.com/office/drawing/2010/main" xmlns="" val="0"/>
+                  <a14:useLocalDpi xmlns="" xmlns:a14="http://schemas.microsoft.com/office/drawing/2010/main" val="0"/>
                 </a:ext>
               </a:extLst>
             </a:blip>
@@ -4101,7 +4094,7 @@
             </a:effectLst>
             <a:extLst>
               <a:ext uri="{909E8E84-426E-40DD-AFC4-6F175D3DCCD1}">
-                <a14:hiddenFill xmlns:a14="http://schemas.microsoft.com/office/drawing/2010/main" xmlns="">
+                <a14:hiddenFill xmlns="" xmlns:a14="http://schemas.microsoft.com/office/drawing/2010/main">
                   <a:solidFill>
                     <a:srgbClr val="FFFFFF"/>
                   </a:solidFill>
@@ -4122,7 +4115,7 @@
             <a:blip r:embed="rId17" cstate="print">
               <a:extLst>
                 <a:ext uri="{28A0092B-C50C-407E-A947-70E740481C1C}">
-                  <a14:useLocalDpi xmlns:a14="http://schemas.microsoft.com/office/drawing/2010/main" xmlns="" val="0"/>
+                  <a14:useLocalDpi xmlns="" xmlns:a14="http://schemas.microsoft.com/office/drawing/2010/main" val="0"/>
                 </a:ext>
               </a:extLst>
             </a:blip>
@@ -4157,7 +4150,7 @@
             </a:effectLst>
             <a:extLst>
               <a:ext uri="{909E8E84-426E-40DD-AFC4-6F175D3DCCD1}">
-                <a14:hiddenFill xmlns:a14="http://schemas.microsoft.com/office/drawing/2010/main" xmlns="">
+                <a14:hiddenFill xmlns="" xmlns:a14="http://schemas.microsoft.com/office/drawing/2010/main">
                   <a:solidFill>
                     <a:srgbClr val="FFFFFF"/>
                   </a:solidFill>
@@ -4178,7 +4171,7 @@
             <a:blip r:embed="rId18" cstate="print">
               <a:extLst>
                 <a:ext uri="{28A0092B-C50C-407E-A947-70E740481C1C}">
-                  <a14:useLocalDpi xmlns:a14="http://schemas.microsoft.com/office/drawing/2010/main" xmlns="" val="0"/>
+                  <a14:useLocalDpi xmlns="" xmlns:a14="http://schemas.microsoft.com/office/drawing/2010/main" val="0"/>
                 </a:ext>
               </a:extLst>
             </a:blip>
@@ -4624,7 +4617,7 @@
         </p:nvSpPr>
         <p:spPr>
           <a:xfrm>
-            <a:off x="6876976" y="10640065"/>
+            <a:off x="6804968" y="10640065"/>
             <a:ext cx="7560840" cy="2123658"/>
           </a:xfrm>
           <a:prstGeom prst="rect">
@@ -5029,7 +5022,7 @@
           <a:blip r:embed="rId22" cstate="print">
             <a:extLst>
               <a:ext uri="{28A0092B-C50C-407E-A947-70E740481C1C}">
-                <a14:useLocalDpi xmlns:a14="http://schemas.microsoft.com/office/drawing/2010/main" xmlns="" val="0"/>
+                <a14:useLocalDpi xmlns="" xmlns:a14="http://schemas.microsoft.com/office/drawing/2010/main" val="0"/>
               </a:ext>
             </a:extLst>
           </a:blip>
@@ -5049,7 +5042,7 @@
           <a:noFill/>
           <a:extLst>
             <a:ext uri="{909E8E84-426E-40DD-AFC4-6F175D3DCCD1}">
-              <a14:hiddenFill xmlns:a14="http://schemas.microsoft.com/office/drawing/2010/main" xmlns="">
+              <a14:hiddenFill xmlns="" xmlns:a14="http://schemas.microsoft.com/office/drawing/2010/main">
                 <a:solidFill>
                   <a:srgbClr val="FFFFFF"/>
                 </a:solidFill>

</xml_diff>